<commit_message>
adding concepts and slides
</commit_message>
<xml_diff>
--- a/2022-04-26 - aC the world! As Code for Anything/PowerShell Summit 2022 - aC the World!.pptx
+++ b/2022-04-26 - aC the world! As Code for Anything/PowerShell Summit 2022 - aC the World!.pptx
@@ -7,11 +7,14 @@
   <p:sldIdLst>
     <p:sldId id="256" r:id="rId2"/>
     <p:sldId id="257" r:id="rId3"/>
-    <p:sldId id="269" r:id="rId4"/>
-    <p:sldId id="258" r:id="rId5"/>
-    <p:sldId id="271" r:id="rId6"/>
+    <p:sldId id="273" r:id="rId4"/>
+    <p:sldId id="269" r:id="rId5"/>
+    <p:sldId id="258" r:id="rId6"/>
     <p:sldId id="272" r:id="rId7"/>
-    <p:sldId id="268" r:id="rId8"/>
+    <p:sldId id="275" r:id="rId8"/>
+    <p:sldId id="274" r:id="rId9"/>
+    <p:sldId id="271" r:id="rId10"/>
+    <p:sldId id="268" r:id="rId11"/>
   </p:sldIdLst>
   <p:sldSz cx="12192000" cy="6858000"/>
   <p:notesSz cx="6858000" cy="9144000"/>
@@ -265,7 +268,7 @@
           <a:p>
             <a:fld id="{D46B952B-F692-4DD1-9678-FCDA40C3FC40}" type="datetimeFigureOut">
               <a:rPr lang="en-US" smtClean="0"/>
-              <a:t>4/19/2022</a:t>
+              <a:t>4/20/2022</a:t>
             </a:fld>
             <a:endParaRPr lang="en-US"/>
           </a:p>
@@ -463,7 +466,7 @@
           <a:p>
             <a:fld id="{D46B952B-F692-4DD1-9678-FCDA40C3FC40}" type="datetimeFigureOut">
               <a:rPr lang="en-US" smtClean="0"/>
-              <a:t>4/19/2022</a:t>
+              <a:t>4/20/2022</a:t>
             </a:fld>
             <a:endParaRPr lang="en-US"/>
           </a:p>
@@ -671,7 +674,7 @@
           <a:p>
             <a:fld id="{D46B952B-F692-4DD1-9678-FCDA40C3FC40}" type="datetimeFigureOut">
               <a:rPr lang="en-US" smtClean="0"/>
-              <a:t>4/19/2022</a:t>
+              <a:t>4/20/2022</a:t>
             </a:fld>
             <a:endParaRPr lang="en-US"/>
           </a:p>
@@ -869,7 +872,7 @@
           <a:p>
             <a:fld id="{D46B952B-F692-4DD1-9678-FCDA40C3FC40}" type="datetimeFigureOut">
               <a:rPr lang="en-US" smtClean="0"/>
-              <a:t>4/19/2022</a:t>
+              <a:t>4/20/2022</a:t>
             </a:fld>
             <a:endParaRPr lang="en-US"/>
           </a:p>
@@ -1144,7 +1147,7 @@
           <a:p>
             <a:fld id="{D46B952B-F692-4DD1-9678-FCDA40C3FC40}" type="datetimeFigureOut">
               <a:rPr lang="en-US" smtClean="0"/>
-              <a:t>4/19/2022</a:t>
+              <a:t>4/20/2022</a:t>
             </a:fld>
             <a:endParaRPr lang="en-US"/>
           </a:p>
@@ -1409,7 +1412,7 @@
           <a:p>
             <a:fld id="{D46B952B-F692-4DD1-9678-FCDA40C3FC40}" type="datetimeFigureOut">
               <a:rPr lang="en-US" smtClean="0"/>
-              <a:t>4/19/2022</a:t>
+              <a:t>4/20/2022</a:t>
             </a:fld>
             <a:endParaRPr lang="en-US"/>
           </a:p>
@@ -1821,7 +1824,7 @@
           <a:p>
             <a:fld id="{D46B952B-F692-4DD1-9678-FCDA40C3FC40}" type="datetimeFigureOut">
               <a:rPr lang="en-US" smtClean="0"/>
-              <a:t>4/19/2022</a:t>
+              <a:t>4/20/2022</a:t>
             </a:fld>
             <a:endParaRPr lang="en-US"/>
           </a:p>
@@ -1962,7 +1965,7 @@
           <a:p>
             <a:fld id="{D46B952B-F692-4DD1-9678-FCDA40C3FC40}" type="datetimeFigureOut">
               <a:rPr lang="en-US" smtClean="0"/>
-              <a:t>4/19/2022</a:t>
+              <a:t>4/20/2022</a:t>
             </a:fld>
             <a:endParaRPr lang="en-US"/>
           </a:p>
@@ -2075,7 +2078,7 @@
           <a:p>
             <a:fld id="{D46B952B-F692-4DD1-9678-FCDA40C3FC40}" type="datetimeFigureOut">
               <a:rPr lang="en-US" smtClean="0"/>
-              <a:t>4/19/2022</a:t>
+              <a:t>4/20/2022</a:t>
             </a:fld>
             <a:endParaRPr lang="en-US"/>
           </a:p>
@@ -2386,7 +2389,7 @@
           <a:p>
             <a:fld id="{D46B952B-F692-4DD1-9678-FCDA40C3FC40}" type="datetimeFigureOut">
               <a:rPr lang="en-US" smtClean="0"/>
-              <a:t>4/19/2022</a:t>
+              <a:t>4/20/2022</a:t>
             </a:fld>
             <a:endParaRPr lang="en-US"/>
           </a:p>
@@ -2674,7 +2677,7 @@
           <a:p>
             <a:fld id="{D46B952B-F692-4DD1-9678-FCDA40C3FC40}" type="datetimeFigureOut">
               <a:rPr lang="en-US" smtClean="0"/>
-              <a:t>4/19/2022</a:t>
+              <a:t>4/20/2022</a:t>
             </a:fld>
             <a:endParaRPr lang="en-US"/>
           </a:p>
@@ -2924,7 +2927,7 @@
           <a:p>
             <a:fld id="{D46B952B-F692-4DD1-9678-FCDA40C3FC40}" type="datetimeFigureOut">
               <a:rPr lang="en-US" smtClean="0"/>
-              <a:t>4/19/2022</a:t>
+              <a:t>4/20/2022</a:t>
             </a:fld>
             <a:endParaRPr lang="en-US"/>
           </a:p>
@@ -3433,6 +3436,104 @@
 </p:sld>
 </file>
 
+<file path=ppt/slides/slide10.xml><?xml version="1.0" encoding="utf-8"?>
+<p:sld xmlns:a="http://schemas.openxmlformats.org/drawingml/2006/main" xmlns:r="http://schemas.openxmlformats.org/officeDocument/2006/relationships" xmlns:p="http://schemas.openxmlformats.org/presentationml/2006/main">
+  <p:cSld>
+    <p:spTree>
+      <p:nvGrpSpPr>
+        <p:cNvPr id="1" name=""/>
+        <p:cNvGrpSpPr/>
+        <p:nvPr/>
+      </p:nvGrpSpPr>
+      <p:grpSpPr>
+        <a:xfrm>
+          <a:off x="0" y="0"/>
+          <a:ext cx="0" cy="0"/>
+          <a:chOff x="0" y="0"/>
+          <a:chExt cx="0" cy="0"/>
+        </a:xfrm>
+      </p:grpSpPr>
+      <p:sp>
+        <p:nvSpPr>
+          <p:cNvPr id="2" name="Title 1">
+            <a:extLst>
+              <a:ext uri="{FF2B5EF4-FFF2-40B4-BE49-F238E27FC236}">
+                <a16:creationId xmlns:a16="http://schemas.microsoft.com/office/drawing/2014/main" id="{F1661924-E51B-4AA1-A1C5-C9AD9EE32D81}"/>
+              </a:ext>
+            </a:extLst>
+          </p:cNvPr>
+          <p:cNvSpPr>
+            <a:spLocks noGrp="1"/>
+          </p:cNvSpPr>
+          <p:nvPr>
+            <p:ph type="title"/>
+          </p:nvPr>
+        </p:nvSpPr>
+        <p:spPr/>
+        <p:txBody>
+          <a:bodyPr/>
+          <a:lstStyle/>
+          <a:p>
+            <a:r>
+              <a:rPr lang="en-US" dirty="0"/>
+              <a:t>Demo Environment</a:t>
+            </a:r>
+          </a:p>
+        </p:txBody>
+      </p:sp>
+      <p:sp>
+        <p:nvSpPr>
+          <p:cNvPr id="3" name="Content Placeholder 2">
+            <a:extLst>
+              <a:ext uri="{FF2B5EF4-FFF2-40B4-BE49-F238E27FC236}">
+                <a16:creationId xmlns:a16="http://schemas.microsoft.com/office/drawing/2014/main" id="{4FA49B7C-A4DE-4ADA-8216-70A81166A541}"/>
+              </a:ext>
+            </a:extLst>
+          </p:cNvPr>
+          <p:cNvSpPr>
+            <a:spLocks noGrp="1"/>
+          </p:cNvSpPr>
+          <p:nvPr>
+            <p:ph idx="1"/>
+          </p:nvPr>
+        </p:nvSpPr>
+        <p:spPr/>
+        <p:txBody>
+          <a:bodyPr/>
+          <a:lstStyle/>
+          <a:p>
+            <a:r>
+              <a:rPr lang="en-US" dirty="0"/>
+              <a:t>Windows 10</a:t>
+            </a:r>
+          </a:p>
+          <a:p>
+            <a:r>
+              <a:rPr lang="en-US" dirty="0"/>
+              <a:t>VS Code (latest version)</a:t>
+            </a:r>
+          </a:p>
+          <a:p>
+            <a:r>
+              <a:rPr lang="en-US" dirty="0"/>
+              <a:t>PowerShell 7.2.2</a:t>
+            </a:r>
+          </a:p>
+        </p:txBody>
+      </p:sp>
+    </p:spTree>
+    <p:extLst>
+      <p:ext uri="{BB962C8B-B14F-4D97-AF65-F5344CB8AC3E}">
+        <p14:creationId xmlns:p14="http://schemas.microsoft.com/office/powerpoint/2010/main" val="3298450064"/>
+      </p:ext>
+    </p:extLst>
+  </p:cSld>
+  <p:clrMapOvr>
+    <a:masterClrMapping/>
+  </p:clrMapOvr>
+</p:sld>
+</file>
+
 <file path=ppt/slides/slide2.xml><?xml version="1.0" encoding="utf-8"?>
 <p:sld xmlns:a="http://schemas.openxmlformats.org/drawingml/2006/main" xmlns:r="http://schemas.openxmlformats.org/officeDocument/2006/relationships" xmlns:p="http://schemas.openxmlformats.org/presentationml/2006/main">
   <p:cSld>
@@ -3668,7 +3769,7 @@
                             </p:stCondLst>
                             <p:childTnLst>
                               <p:par>
-                                <p:cTn id="5" presetID="1" presetClass="entr" presetSubtype="0" fill="hold" nodeType="clickEffect">
+                                <p:cTn id="5" presetID="1" presetClass="entr" presetSubtype="0" fill="hold" grpId="0" nodeType="clickEffect">
                                   <p:stCondLst>
                                     <p:cond delay="0"/>
                                   </p:stCondLst>
@@ -3698,33 +3799,15 @@
                                   </p:childTnLst>
                                 </p:cTn>
                               </p:par>
-                            </p:childTnLst>
-                          </p:cTn>
-                        </p:par>
-                      </p:childTnLst>
-                    </p:cTn>
-                  </p:par>
-                  <p:par>
-                    <p:cTn id="7" fill="hold">
-                      <p:stCondLst>
-                        <p:cond delay="indefinite"/>
-                      </p:stCondLst>
-                      <p:childTnLst>
-                        <p:par>
-                          <p:cTn id="8" fill="hold">
-                            <p:stCondLst>
-                              <p:cond delay="0"/>
-                            </p:stCondLst>
-                            <p:childTnLst>
                               <p:par>
-                                <p:cTn id="9" presetID="1" presetClass="entr" presetSubtype="0" fill="hold" nodeType="clickEffect">
+                                <p:cTn id="7" presetID="1" presetClass="entr" presetSubtype="0" fill="hold" grpId="0" nodeType="withEffect">
                                   <p:stCondLst>
                                     <p:cond delay="0"/>
                                   </p:stCondLst>
                                   <p:childTnLst>
                                     <p:set>
                                       <p:cBhvr>
-                                        <p:cTn id="10" dur="1" fill="hold">
+                                        <p:cTn id="8" dur="1" fill="hold">
                                           <p:stCondLst>
                                             <p:cond delay="0"/>
                                           </p:stCondLst>
@@ -3747,33 +3830,15 @@
                                   </p:childTnLst>
                                 </p:cTn>
                               </p:par>
-                            </p:childTnLst>
-                          </p:cTn>
-                        </p:par>
-                      </p:childTnLst>
-                    </p:cTn>
-                  </p:par>
-                  <p:par>
-                    <p:cTn id="11" fill="hold">
-                      <p:stCondLst>
-                        <p:cond delay="indefinite"/>
-                      </p:stCondLst>
-                      <p:childTnLst>
-                        <p:par>
-                          <p:cTn id="12" fill="hold">
-                            <p:stCondLst>
-                              <p:cond delay="0"/>
-                            </p:stCondLst>
-                            <p:childTnLst>
                               <p:par>
-                                <p:cTn id="13" presetID="1" presetClass="entr" presetSubtype="0" fill="hold" nodeType="clickEffect">
+                                <p:cTn id="9" presetID="1" presetClass="entr" presetSubtype="0" fill="hold" grpId="0" nodeType="withEffect">
                                   <p:stCondLst>
                                     <p:cond delay="0"/>
                                   </p:stCondLst>
                                   <p:childTnLst>
                                     <p:set>
                                       <p:cBhvr>
-                                        <p:cTn id="14" dur="1" fill="hold">
+                                        <p:cTn id="10" dur="1" fill="hold">
                                           <p:stCondLst>
                                             <p:cond delay="0"/>
                                           </p:stCondLst>
@@ -3796,33 +3861,15 @@
                                   </p:childTnLst>
                                 </p:cTn>
                               </p:par>
-                            </p:childTnLst>
-                          </p:cTn>
-                        </p:par>
-                      </p:childTnLst>
-                    </p:cTn>
-                  </p:par>
-                  <p:par>
-                    <p:cTn id="15" fill="hold">
-                      <p:stCondLst>
-                        <p:cond delay="indefinite"/>
-                      </p:stCondLst>
-                      <p:childTnLst>
-                        <p:par>
-                          <p:cTn id="16" fill="hold">
-                            <p:stCondLst>
-                              <p:cond delay="0"/>
-                            </p:stCondLst>
-                            <p:childTnLst>
                               <p:par>
-                                <p:cTn id="17" presetID="1" presetClass="entr" presetSubtype="0" fill="hold" nodeType="clickEffect">
+                                <p:cTn id="11" presetID="1" presetClass="entr" presetSubtype="0" fill="hold" grpId="0" nodeType="withEffect">
                                   <p:stCondLst>
                                     <p:cond delay="0"/>
                                   </p:stCondLst>
                                   <p:childTnLst>
                                     <p:set>
                                       <p:cBhvr>
-                                        <p:cTn id="18" dur="1" fill="hold">
+                                        <p:cTn id="12" dur="1" fill="hold">
                                           <p:stCondLst>
                                             <p:cond delay="0"/>
                                           </p:stCondLst>
@@ -3845,33 +3892,15 @@
                                   </p:childTnLst>
                                 </p:cTn>
                               </p:par>
-                            </p:childTnLst>
-                          </p:cTn>
-                        </p:par>
-                      </p:childTnLst>
-                    </p:cTn>
-                  </p:par>
-                  <p:par>
-                    <p:cTn id="19" fill="hold">
-                      <p:stCondLst>
-                        <p:cond delay="indefinite"/>
-                      </p:stCondLst>
-                      <p:childTnLst>
-                        <p:par>
-                          <p:cTn id="20" fill="hold">
-                            <p:stCondLst>
-                              <p:cond delay="0"/>
-                            </p:stCondLst>
-                            <p:childTnLst>
                               <p:par>
-                                <p:cTn id="21" presetID="1" presetClass="entr" presetSubtype="0" fill="hold" nodeType="clickEffect">
+                                <p:cTn id="13" presetID="1" presetClass="entr" presetSubtype="0" fill="hold" grpId="0" nodeType="withEffect">
                                   <p:stCondLst>
                                     <p:cond delay="0"/>
                                   </p:stCondLst>
                                   <p:childTnLst>
                                     <p:set>
                                       <p:cBhvr>
-                                        <p:cTn id="22" dur="1" fill="hold">
+                                        <p:cTn id="14" dur="1" fill="hold">
                                           <p:stCondLst>
                                             <p:cond delay="0"/>
                                           </p:stCondLst>
@@ -3894,33 +3923,15 @@
                                   </p:childTnLst>
                                 </p:cTn>
                               </p:par>
-                            </p:childTnLst>
-                          </p:cTn>
-                        </p:par>
-                      </p:childTnLst>
-                    </p:cTn>
-                  </p:par>
-                  <p:par>
-                    <p:cTn id="23" fill="hold">
-                      <p:stCondLst>
-                        <p:cond delay="indefinite"/>
-                      </p:stCondLst>
-                      <p:childTnLst>
-                        <p:par>
-                          <p:cTn id="24" fill="hold">
-                            <p:stCondLst>
-                              <p:cond delay="0"/>
-                            </p:stCondLst>
-                            <p:childTnLst>
                               <p:par>
-                                <p:cTn id="25" presetID="1" presetClass="entr" presetSubtype="0" fill="hold" nodeType="clickEffect">
+                                <p:cTn id="15" presetID="1" presetClass="entr" presetSubtype="0" fill="hold" grpId="0" nodeType="withEffect">
                                   <p:stCondLst>
                                     <p:cond delay="0"/>
                                   </p:stCondLst>
                                   <p:childTnLst>
                                     <p:set>
                                       <p:cBhvr>
-                                        <p:cTn id="26" dur="1" fill="hold">
+                                        <p:cTn id="16" dur="1" fill="hold">
                                           <p:stCondLst>
                                             <p:cond delay="0"/>
                                           </p:stCondLst>
@@ -3943,33 +3954,15 @@
                                   </p:childTnLst>
                                 </p:cTn>
                               </p:par>
-                            </p:childTnLst>
-                          </p:cTn>
-                        </p:par>
-                      </p:childTnLst>
-                    </p:cTn>
-                  </p:par>
-                  <p:par>
-                    <p:cTn id="27" fill="hold">
-                      <p:stCondLst>
-                        <p:cond delay="indefinite"/>
-                      </p:stCondLst>
-                      <p:childTnLst>
-                        <p:par>
-                          <p:cTn id="28" fill="hold">
-                            <p:stCondLst>
-                              <p:cond delay="0"/>
-                            </p:stCondLst>
-                            <p:childTnLst>
                               <p:par>
-                                <p:cTn id="29" presetID="1" presetClass="entr" presetSubtype="0" fill="hold" nodeType="clickEffect">
+                                <p:cTn id="17" presetID="1" presetClass="entr" presetSubtype="0" fill="hold" grpId="0" nodeType="withEffect">
                                   <p:stCondLst>
                                     <p:cond delay="0"/>
                                   </p:stCondLst>
                                   <p:childTnLst>
                                     <p:set>
                                       <p:cBhvr>
-                                        <p:cTn id="30" dur="1" fill="hold">
+                                        <p:cTn id="18" dur="1" fill="hold">
                                           <p:stCondLst>
                                             <p:cond delay="0"/>
                                           </p:stCondLst>
@@ -3992,33 +3985,15 @@
                                   </p:childTnLst>
                                 </p:cTn>
                               </p:par>
-                            </p:childTnLst>
-                          </p:cTn>
-                        </p:par>
-                      </p:childTnLst>
-                    </p:cTn>
-                  </p:par>
-                  <p:par>
-                    <p:cTn id="31" fill="hold">
-                      <p:stCondLst>
-                        <p:cond delay="indefinite"/>
-                      </p:stCondLst>
-                      <p:childTnLst>
-                        <p:par>
-                          <p:cTn id="32" fill="hold">
-                            <p:stCondLst>
-                              <p:cond delay="0"/>
-                            </p:stCondLst>
-                            <p:childTnLst>
                               <p:par>
-                                <p:cTn id="33" presetID="1" presetClass="entr" presetSubtype="0" fill="hold" nodeType="clickEffect">
+                                <p:cTn id="19" presetID="1" presetClass="entr" presetSubtype="0" fill="hold" grpId="0" nodeType="withEffect">
                                   <p:stCondLst>
                                     <p:cond delay="0"/>
                                   </p:stCondLst>
                                   <p:childTnLst>
                                     <p:set>
                                       <p:cBhvr>
-                                        <p:cTn id="34" dur="1" fill="hold">
+                                        <p:cTn id="20" dur="1" fill="hold">
                                           <p:stCondLst>
                                             <p:cond delay="0"/>
                                           </p:stCondLst>
@@ -4041,33 +4016,15 @@
                                   </p:childTnLst>
                                 </p:cTn>
                               </p:par>
-                            </p:childTnLst>
-                          </p:cTn>
-                        </p:par>
-                      </p:childTnLst>
-                    </p:cTn>
-                  </p:par>
-                  <p:par>
-                    <p:cTn id="35" fill="hold">
-                      <p:stCondLst>
-                        <p:cond delay="indefinite"/>
-                      </p:stCondLst>
-                      <p:childTnLst>
-                        <p:par>
-                          <p:cTn id="36" fill="hold">
-                            <p:stCondLst>
-                              <p:cond delay="0"/>
-                            </p:stCondLst>
-                            <p:childTnLst>
                               <p:par>
-                                <p:cTn id="37" presetID="1" presetClass="entr" presetSubtype="0" fill="hold" nodeType="clickEffect">
+                                <p:cTn id="21" presetID="1" presetClass="entr" presetSubtype="0" fill="hold" grpId="0" nodeType="withEffect">
                                   <p:stCondLst>
                                     <p:cond delay="0"/>
                                   </p:stCondLst>
                                   <p:childTnLst>
                                     <p:set>
                                       <p:cBhvr>
-                                        <p:cTn id="38" dur="1" fill="hold">
+                                        <p:cTn id="22" dur="1" fill="hold">
                                           <p:stCondLst>
                                             <p:cond delay="0"/>
                                           </p:stCondLst>
@@ -4090,33 +4047,15 @@
                                   </p:childTnLst>
                                 </p:cTn>
                               </p:par>
-                            </p:childTnLst>
-                          </p:cTn>
-                        </p:par>
-                      </p:childTnLst>
-                    </p:cTn>
-                  </p:par>
-                  <p:par>
-                    <p:cTn id="39" fill="hold">
-                      <p:stCondLst>
-                        <p:cond delay="indefinite"/>
-                      </p:stCondLst>
-                      <p:childTnLst>
-                        <p:par>
-                          <p:cTn id="40" fill="hold">
-                            <p:stCondLst>
-                              <p:cond delay="0"/>
-                            </p:stCondLst>
-                            <p:childTnLst>
                               <p:par>
-                                <p:cTn id="41" presetID="1" presetClass="entr" presetSubtype="0" fill="hold" nodeType="clickEffect">
+                                <p:cTn id="23" presetID="1" presetClass="entr" presetSubtype="0" fill="hold" grpId="0" nodeType="withEffect">
                                   <p:stCondLst>
                                     <p:cond delay="0"/>
                                   </p:stCondLst>
                                   <p:childTnLst>
                                     <p:set>
                                       <p:cBhvr>
-                                        <p:cTn id="42" dur="1" fill="hold">
+                                        <p:cTn id="24" dur="1" fill="hold">
                                           <p:stCondLst>
                                             <p:cond delay="0"/>
                                           </p:stCondLst>
@@ -4166,6 +4105,9 @@
         </p:cTn>
       </p:par>
     </p:tnLst>
+    <p:bldLst>
+      <p:bldP spid="3" grpId="0" build="p"/>
+    </p:bldLst>
   </p:timing>
 </p:sld>
 </file>
@@ -4192,6 +4134,89 @@
           <p:cNvPr id="2" name="Title 1">
             <a:extLst>
               <a:ext uri="{FF2B5EF4-FFF2-40B4-BE49-F238E27FC236}">
+                <a16:creationId xmlns:a16="http://schemas.microsoft.com/office/drawing/2014/main" id="{45DB552B-235C-4E98-B84E-1AB7D6CFED94}"/>
+              </a:ext>
+            </a:extLst>
+          </p:cNvPr>
+          <p:cNvSpPr>
+            <a:spLocks noGrp="1"/>
+          </p:cNvSpPr>
+          <p:nvPr>
+            <p:ph type="title"/>
+          </p:nvPr>
+        </p:nvSpPr>
+        <p:spPr/>
+        <p:txBody>
+          <a:bodyPr/>
+          <a:lstStyle/>
+          <a:p>
+            <a:r>
+              <a:rPr lang="en-US" dirty="0"/>
+              <a:t>I like PowerShell</a:t>
+            </a:r>
+          </a:p>
+        </p:txBody>
+      </p:sp>
+      <p:sp>
+        <p:nvSpPr>
+          <p:cNvPr id="3" name="Text Placeholder 2">
+            <a:extLst>
+              <a:ext uri="{FF2B5EF4-FFF2-40B4-BE49-F238E27FC236}">
+                <a16:creationId xmlns:a16="http://schemas.microsoft.com/office/drawing/2014/main" id="{03B949E7-5D8A-41B4-B69D-BE477B1ABB36}"/>
+              </a:ext>
+            </a:extLst>
+          </p:cNvPr>
+          <p:cNvSpPr>
+            <a:spLocks noGrp="1"/>
+          </p:cNvSpPr>
+          <p:nvPr>
+            <p:ph type="body" idx="1"/>
+          </p:nvPr>
+        </p:nvSpPr>
+        <p:spPr/>
+        <p:txBody>
+          <a:bodyPr/>
+          <a:lstStyle/>
+          <a:p>
+            <a:endParaRPr lang="en-US"/>
+          </a:p>
+        </p:txBody>
+      </p:sp>
+    </p:spTree>
+    <p:extLst>
+      <p:ext uri="{BB962C8B-B14F-4D97-AF65-F5344CB8AC3E}">
+        <p14:creationId xmlns:p14="http://schemas.microsoft.com/office/powerpoint/2010/main" val="1830393405"/>
+      </p:ext>
+    </p:extLst>
+  </p:cSld>
+  <p:clrMapOvr>
+    <a:masterClrMapping/>
+  </p:clrMapOvr>
+</p:sld>
+</file>
+
+<file path=ppt/slides/slide4.xml><?xml version="1.0" encoding="utf-8"?>
+<p:sld xmlns:a="http://schemas.openxmlformats.org/drawingml/2006/main" xmlns:r="http://schemas.openxmlformats.org/officeDocument/2006/relationships" xmlns:p="http://schemas.openxmlformats.org/presentationml/2006/main">
+  <p:cSld>
+    <p:spTree>
+      <p:nvGrpSpPr>
+        <p:cNvPr id="1" name=""/>
+        <p:cNvGrpSpPr/>
+        <p:nvPr/>
+      </p:nvGrpSpPr>
+      <p:grpSpPr>
+        <a:xfrm>
+          <a:off x="0" y="0"/>
+          <a:ext cx="0" cy="0"/>
+          <a:chOff x="0" y="0"/>
+          <a:chExt cx="0" cy="0"/>
+        </a:xfrm>
+      </p:grpSpPr>
+      <p:sp>
+        <p:nvSpPr>
+          <p:cNvPr id="2" name="Title 1">
+            <a:extLst>
+              <a:ext uri="{FF2B5EF4-FFF2-40B4-BE49-F238E27FC236}">
                 <a16:creationId xmlns:a16="http://schemas.microsoft.com/office/drawing/2014/main" id="{0BDA3766-FD99-427E-AF3F-465203174D13}"/>
               </a:ext>
             </a:extLst>
@@ -4247,7 +4272,7 @@
             <a:pPr lvl="1"/>
             <a:r>
               <a:rPr lang="en-US" dirty="0"/>
-              <a:t>Azure ARM templates</a:t>
+              <a:t>Azure ARM templates or Azure Bicep</a:t>
             </a:r>
           </a:p>
           <a:p>
@@ -4339,7 +4364,7 @@
                             </p:stCondLst>
                             <p:childTnLst>
                               <p:par>
-                                <p:cTn id="5" presetID="1" presetClass="entr" presetSubtype="0" fill="hold" nodeType="clickEffect">
+                                <p:cTn id="5" presetID="1" presetClass="entr" presetSubtype="0" fill="hold" grpId="0" nodeType="clickEffect">
                                   <p:stCondLst>
                                     <p:cond delay="0"/>
                                   </p:stCondLst>
@@ -4369,33 +4394,15 @@
                                   </p:childTnLst>
                                 </p:cTn>
                               </p:par>
-                            </p:childTnLst>
-                          </p:cTn>
-                        </p:par>
-                      </p:childTnLst>
-                    </p:cTn>
-                  </p:par>
-                  <p:par>
-                    <p:cTn id="7" fill="hold">
-                      <p:stCondLst>
-                        <p:cond delay="indefinite"/>
-                      </p:stCondLst>
-                      <p:childTnLst>
-                        <p:par>
-                          <p:cTn id="8" fill="hold">
-                            <p:stCondLst>
-                              <p:cond delay="0"/>
-                            </p:stCondLst>
-                            <p:childTnLst>
                               <p:par>
-                                <p:cTn id="9" presetID="1" presetClass="entr" presetSubtype="0" fill="hold" nodeType="clickEffect">
+                                <p:cTn id="7" presetID="1" presetClass="entr" presetSubtype="0" fill="hold" grpId="0" nodeType="withEffect">
                                   <p:stCondLst>
                                     <p:cond delay="0"/>
                                   </p:stCondLst>
                                   <p:childTnLst>
                                     <p:set>
                                       <p:cBhvr>
-                                        <p:cTn id="10" dur="1" fill="hold">
+                                        <p:cTn id="8" dur="1" fill="hold">
                                           <p:stCondLst>
                                             <p:cond delay="0"/>
                                           </p:stCondLst>
@@ -4418,33 +4425,15 @@
                                   </p:childTnLst>
                                 </p:cTn>
                               </p:par>
-                            </p:childTnLst>
-                          </p:cTn>
-                        </p:par>
-                      </p:childTnLst>
-                    </p:cTn>
-                  </p:par>
-                  <p:par>
-                    <p:cTn id="11" fill="hold">
-                      <p:stCondLst>
-                        <p:cond delay="indefinite"/>
-                      </p:stCondLst>
-                      <p:childTnLst>
-                        <p:par>
-                          <p:cTn id="12" fill="hold">
-                            <p:stCondLst>
-                              <p:cond delay="0"/>
-                            </p:stCondLst>
-                            <p:childTnLst>
                               <p:par>
-                                <p:cTn id="13" presetID="1" presetClass="entr" presetSubtype="0" fill="hold" nodeType="clickEffect">
+                                <p:cTn id="9" presetID="1" presetClass="entr" presetSubtype="0" fill="hold" grpId="0" nodeType="withEffect">
                                   <p:stCondLst>
                                     <p:cond delay="0"/>
                                   </p:stCondLst>
                                   <p:childTnLst>
                                     <p:set>
                                       <p:cBhvr>
-                                        <p:cTn id="14" dur="1" fill="hold">
+                                        <p:cTn id="10" dur="1" fill="hold">
                                           <p:stCondLst>
                                             <p:cond delay="0"/>
                                           </p:stCondLst>
@@ -4467,33 +4456,15 @@
                                   </p:childTnLst>
                                 </p:cTn>
                               </p:par>
-                            </p:childTnLst>
-                          </p:cTn>
-                        </p:par>
-                      </p:childTnLst>
-                    </p:cTn>
-                  </p:par>
-                  <p:par>
-                    <p:cTn id="15" fill="hold">
-                      <p:stCondLst>
-                        <p:cond delay="indefinite"/>
-                      </p:stCondLst>
-                      <p:childTnLst>
-                        <p:par>
-                          <p:cTn id="16" fill="hold">
-                            <p:stCondLst>
-                              <p:cond delay="0"/>
-                            </p:stCondLst>
-                            <p:childTnLst>
                               <p:par>
-                                <p:cTn id="17" presetID="1" presetClass="entr" presetSubtype="0" fill="hold" nodeType="clickEffect">
+                                <p:cTn id="11" presetID="1" presetClass="entr" presetSubtype="0" fill="hold" grpId="0" nodeType="withEffect">
                                   <p:stCondLst>
                                     <p:cond delay="0"/>
                                   </p:stCondLst>
                                   <p:childTnLst>
                                     <p:set>
                                       <p:cBhvr>
-                                        <p:cTn id="18" dur="1" fill="hold">
+                                        <p:cTn id="12" dur="1" fill="hold">
                                           <p:stCondLst>
                                             <p:cond delay="0"/>
                                           </p:stCondLst>
@@ -4523,26 +4494,26 @@
                     </p:cTn>
                   </p:par>
                   <p:par>
-                    <p:cTn id="19" fill="hold">
+                    <p:cTn id="13" fill="hold">
                       <p:stCondLst>
                         <p:cond delay="indefinite"/>
                       </p:stCondLst>
                       <p:childTnLst>
                         <p:par>
-                          <p:cTn id="20" fill="hold">
+                          <p:cTn id="14" fill="hold">
                             <p:stCondLst>
                               <p:cond delay="0"/>
                             </p:stCondLst>
                             <p:childTnLst>
                               <p:par>
-                                <p:cTn id="21" presetID="1" presetClass="entr" presetSubtype="0" fill="hold" nodeType="clickEffect">
+                                <p:cTn id="15" presetID="1" presetClass="entr" presetSubtype="0" fill="hold" grpId="0" nodeType="clickEffect">
                                   <p:stCondLst>
                                     <p:cond delay="0"/>
                                   </p:stCondLst>
                                   <p:childTnLst>
                                     <p:set>
                                       <p:cBhvr>
-                                        <p:cTn id="22" dur="1" fill="hold">
+                                        <p:cTn id="16" dur="1" fill="hold">
                                           <p:stCondLst>
                                             <p:cond delay="0"/>
                                           </p:stCondLst>
@@ -4565,33 +4536,15 @@
                                   </p:childTnLst>
                                 </p:cTn>
                               </p:par>
-                            </p:childTnLst>
-                          </p:cTn>
-                        </p:par>
-                      </p:childTnLst>
-                    </p:cTn>
-                  </p:par>
-                  <p:par>
-                    <p:cTn id="23" fill="hold">
-                      <p:stCondLst>
-                        <p:cond delay="indefinite"/>
-                      </p:stCondLst>
-                      <p:childTnLst>
-                        <p:par>
-                          <p:cTn id="24" fill="hold">
-                            <p:stCondLst>
-                              <p:cond delay="0"/>
-                            </p:stCondLst>
-                            <p:childTnLst>
                               <p:par>
-                                <p:cTn id="25" presetID="1" presetClass="entr" presetSubtype="0" fill="hold" nodeType="clickEffect">
+                                <p:cTn id="17" presetID="1" presetClass="entr" presetSubtype="0" fill="hold" grpId="0" nodeType="withEffect">
                                   <p:stCondLst>
                                     <p:cond delay="0"/>
                                   </p:stCondLst>
                                   <p:childTnLst>
                                     <p:set>
                                       <p:cBhvr>
-                                        <p:cTn id="26" dur="1" fill="hold">
+                                        <p:cTn id="18" dur="1" fill="hold">
                                           <p:stCondLst>
                                             <p:cond delay="0"/>
                                           </p:stCondLst>
@@ -4614,33 +4567,15 @@
                                   </p:childTnLst>
                                 </p:cTn>
                               </p:par>
-                            </p:childTnLst>
-                          </p:cTn>
-                        </p:par>
-                      </p:childTnLst>
-                    </p:cTn>
-                  </p:par>
-                  <p:par>
-                    <p:cTn id="27" fill="hold">
-                      <p:stCondLst>
-                        <p:cond delay="indefinite"/>
-                      </p:stCondLst>
-                      <p:childTnLst>
-                        <p:par>
-                          <p:cTn id="28" fill="hold">
-                            <p:stCondLst>
-                              <p:cond delay="0"/>
-                            </p:stCondLst>
-                            <p:childTnLst>
                               <p:par>
-                                <p:cTn id="29" presetID="1" presetClass="entr" presetSubtype="0" fill="hold" nodeType="clickEffect">
+                                <p:cTn id="19" presetID="1" presetClass="entr" presetSubtype="0" fill="hold" grpId="0" nodeType="withEffect">
                                   <p:stCondLst>
                                     <p:cond delay="0"/>
                                   </p:stCondLst>
                                   <p:childTnLst>
                                     <p:set>
                                       <p:cBhvr>
-                                        <p:cTn id="30" dur="1" fill="hold">
+                                        <p:cTn id="20" dur="1" fill="hold">
                                           <p:stCondLst>
                                             <p:cond delay="0"/>
                                           </p:stCondLst>
@@ -4663,33 +4598,15 @@
                                   </p:childTnLst>
                                 </p:cTn>
                               </p:par>
-                            </p:childTnLst>
-                          </p:cTn>
-                        </p:par>
-                      </p:childTnLst>
-                    </p:cTn>
-                  </p:par>
-                  <p:par>
-                    <p:cTn id="31" fill="hold">
-                      <p:stCondLst>
-                        <p:cond delay="indefinite"/>
-                      </p:stCondLst>
-                      <p:childTnLst>
-                        <p:par>
-                          <p:cTn id="32" fill="hold">
-                            <p:stCondLst>
-                              <p:cond delay="0"/>
-                            </p:stCondLst>
-                            <p:childTnLst>
                               <p:par>
-                                <p:cTn id="33" presetID="1" presetClass="entr" presetSubtype="0" fill="hold" nodeType="clickEffect">
+                                <p:cTn id="21" presetID="1" presetClass="entr" presetSubtype="0" fill="hold" grpId="0" nodeType="withEffect">
                                   <p:stCondLst>
                                     <p:cond delay="0"/>
                                   </p:stCondLst>
                                   <p:childTnLst>
                                     <p:set>
                                       <p:cBhvr>
-                                        <p:cTn id="34" dur="1" fill="hold">
+                                        <p:cTn id="22" dur="1" fill="hold">
                                           <p:stCondLst>
                                             <p:cond delay="0"/>
                                           </p:stCondLst>
@@ -4712,33 +4629,15 @@
                                   </p:childTnLst>
                                 </p:cTn>
                               </p:par>
-                            </p:childTnLst>
-                          </p:cTn>
-                        </p:par>
-                      </p:childTnLst>
-                    </p:cTn>
-                  </p:par>
-                  <p:par>
-                    <p:cTn id="35" fill="hold">
-                      <p:stCondLst>
-                        <p:cond delay="indefinite"/>
-                      </p:stCondLst>
-                      <p:childTnLst>
-                        <p:par>
-                          <p:cTn id="36" fill="hold">
-                            <p:stCondLst>
-                              <p:cond delay="0"/>
-                            </p:stCondLst>
-                            <p:childTnLst>
                               <p:par>
-                                <p:cTn id="37" presetID="1" presetClass="entr" presetSubtype="0" fill="hold" nodeType="clickEffect">
+                                <p:cTn id="23" presetID="1" presetClass="entr" presetSubtype="0" fill="hold" grpId="0" nodeType="withEffect">
                                   <p:stCondLst>
                                     <p:cond delay="0"/>
                                   </p:stCondLst>
                                   <p:childTnLst>
                                     <p:set>
                                       <p:cBhvr>
-                                        <p:cTn id="38" dur="1" fill="hold">
+                                        <p:cTn id="24" dur="1" fill="hold">
                                           <p:stCondLst>
                                             <p:cond delay="0"/>
                                           </p:stCondLst>
@@ -4761,33 +4660,15 @@
                                   </p:childTnLst>
                                 </p:cTn>
                               </p:par>
-                            </p:childTnLst>
-                          </p:cTn>
-                        </p:par>
-                      </p:childTnLst>
-                    </p:cTn>
-                  </p:par>
-                  <p:par>
-                    <p:cTn id="39" fill="hold">
-                      <p:stCondLst>
-                        <p:cond delay="indefinite"/>
-                      </p:stCondLst>
-                      <p:childTnLst>
-                        <p:par>
-                          <p:cTn id="40" fill="hold">
-                            <p:stCondLst>
-                              <p:cond delay="0"/>
-                            </p:stCondLst>
-                            <p:childTnLst>
                               <p:par>
-                                <p:cTn id="41" presetID="1" presetClass="entr" presetSubtype="0" fill="hold" nodeType="clickEffect">
+                                <p:cTn id="25" presetID="1" presetClass="entr" presetSubtype="0" fill="hold" grpId="0" nodeType="withEffect">
                                   <p:stCondLst>
                                     <p:cond delay="0"/>
                                   </p:stCondLst>
                                   <p:childTnLst>
                                     <p:set>
                                       <p:cBhvr>
-                                        <p:cTn id="42" dur="1" fill="hold">
+                                        <p:cTn id="26" dur="1" fill="hold">
                                           <p:stCondLst>
                                             <p:cond delay="0"/>
                                           </p:stCondLst>
@@ -4837,11 +4718,14 @@
         </p:cTn>
       </p:par>
     </p:tnLst>
+    <p:bldLst>
+      <p:bldP spid="3" grpId="0" build="p"/>
+    </p:bldLst>
   </p:timing>
 </p:sld>
 </file>
 
-<file path=ppt/slides/slide4.xml><?xml version="1.0" encoding="utf-8"?>
+<file path=ppt/slides/slide5.xml><?xml version="1.0" encoding="utf-8"?>
 <p:sld xmlns:a="http://schemas.openxmlformats.org/drawingml/2006/main" xmlns:r="http://schemas.openxmlformats.org/officeDocument/2006/relationships" xmlns:p="http://schemas.openxmlformats.org/presentationml/2006/main">
   <p:cSld>
     <p:spTree>
@@ -4925,7 +4809,21 @@
             <a:pPr lvl="1"/>
             <a:r>
               <a:rPr lang="en-US" dirty="0"/>
-              <a:t>i.e. If you are creating a VM based on a config, you ensure that it exists and that it has the requested amount of CPU and memory. If it doesn’t, you correct it.</a:t>
+              <a:t>Approaches:</a:t>
+            </a:r>
+          </a:p>
+          <a:p>
+            <a:pPr lvl="2"/>
+            <a:r>
+              <a:rPr lang="en-US" dirty="0"/>
+              <a:t>Check each property, change as needed</a:t>
+            </a:r>
+          </a:p>
+          <a:p>
+            <a:pPr lvl="2"/>
+            <a:r>
+              <a:rPr lang="en-US" dirty="0"/>
+              <a:t>One big Set-Resource with all parameters</a:t>
             </a:r>
           </a:p>
           <a:p>
@@ -5073,6 +4971,68 @@
                                   </p:childTnLst>
                                 </p:cTn>
                               </p:par>
+                              <p:par>
+                                <p:cTn id="11" presetID="1" presetClass="entr" presetSubtype="0" fill="hold" grpId="0" nodeType="withEffect">
+                                  <p:stCondLst>
+                                    <p:cond delay="0"/>
+                                  </p:stCondLst>
+                                  <p:childTnLst>
+                                    <p:set>
+                                      <p:cBhvr>
+                                        <p:cTn id="12" dur="1" fill="hold">
+                                          <p:stCondLst>
+                                            <p:cond delay="0"/>
+                                          </p:stCondLst>
+                                        </p:cTn>
+                                        <p:tgtEl>
+                                          <p:spTgt spid="3">
+                                            <p:txEl>
+                                              <p:pRg st="3" end="3"/>
+                                            </p:txEl>
+                                          </p:spTgt>
+                                        </p:tgtEl>
+                                        <p:attrNameLst>
+                                          <p:attrName>style.visibility</p:attrName>
+                                        </p:attrNameLst>
+                                      </p:cBhvr>
+                                      <p:to>
+                                        <p:strVal val="visible"/>
+                                      </p:to>
+                                    </p:set>
+                                  </p:childTnLst>
+                                </p:cTn>
+                              </p:par>
+                              <p:par>
+                                <p:cTn id="13" presetID="1" presetClass="entr" presetSubtype="0" fill="hold" grpId="0" nodeType="withEffect">
+                                  <p:stCondLst>
+                                    <p:cond delay="0"/>
+                                  </p:stCondLst>
+                                  <p:childTnLst>
+                                    <p:set>
+                                      <p:cBhvr>
+                                        <p:cTn id="14" dur="1" fill="hold">
+                                          <p:stCondLst>
+                                            <p:cond delay="0"/>
+                                          </p:stCondLst>
+                                        </p:cTn>
+                                        <p:tgtEl>
+                                          <p:spTgt spid="3">
+                                            <p:txEl>
+                                              <p:pRg st="4" end="4"/>
+                                            </p:txEl>
+                                          </p:spTgt>
+                                        </p:tgtEl>
+                                        <p:attrNameLst>
+                                          <p:attrName>style.visibility</p:attrName>
+                                        </p:attrNameLst>
+                                      </p:cBhvr>
+                                      <p:to>
+                                        <p:strVal val="visible"/>
+                                      </p:to>
+                                    </p:set>
+                                  </p:childTnLst>
+                                </p:cTn>
+                              </p:par>
                             </p:childTnLst>
                           </p:cTn>
                         </p:par>
@@ -5080,19 +5040,413 @@
                     </p:cTn>
                   </p:par>
                   <p:par>
-                    <p:cTn id="11" fill="hold">
+                    <p:cTn id="15" fill="hold">
                       <p:stCondLst>
                         <p:cond delay="indefinite"/>
                       </p:stCondLst>
                       <p:childTnLst>
                         <p:par>
-                          <p:cTn id="12" fill="hold">
+                          <p:cTn id="16" fill="hold">
                             <p:stCondLst>
                               <p:cond delay="0"/>
                             </p:stCondLst>
                             <p:childTnLst>
                               <p:par>
-                                <p:cTn id="13" presetID="1" presetClass="entr" presetSubtype="0" fill="hold" grpId="0" nodeType="clickEffect">
+                                <p:cTn id="17" presetID="1" presetClass="entr" presetSubtype="0" fill="hold" grpId="0" nodeType="clickEffect">
+                                  <p:stCondLst>
+                                    <p:cond delay="0"/>
+                                  </p:stCondLst>
+                                  <p:childTnLst>
+                                    <p:set>
+                                      <p:cBhvr>
+                                        <p:cTn id="18" dur="1" fill="hold">
+                                          <p:stCondLst>
+                                            <p:cond delay="0"/>
+                                          </p:stCondLst>
+                                        </p:cTn>
+                                        <p:tgtEl>
+                                          <p:spTgt spid="3">
+                                            <p:txEl>
+                                              <p:pRg st="5" end="5"/>
+                                            </p:txEl>
+                                          </p:spTgt>
+                                        </p:tgtEl>
+                                        <p:attrNameLst>
+                                          <p:attrName>style.visibility</p:attrName>
+                                        </p:attrNameLst>
+                                      </p:cBhvr>
+                                      <p:to>
+                                        <p:strVal val="visible"/>
+                                      </p:to>
+                                    </p:set>
+                                  </p:childTnLst>
+                                </p:cTn>
+                              </p:par>
+                              <p:par>
+                                <p:cTn id="19" presetID="1" presetClass="entr" presetSubtype="0" fill="hold" grpId="0" nodeType="withEffect">
+                                  <p:stCondLst>
+                                    <p:cond delay="0"/>
+                                  </p:stCondLst>
+                                  <p:childTnLst>
+                                    <p:set>
+                                      <p:cBhvr>
+                                        <p:cTn id="20" dur="1" fill="hold">
+                                          <p:stCondLst>
+                                            <p:cond delay="0"/>
+                                          </p:stCondLst>
+                                        </p:cTn>
+                                        <p:tgtEl>
+                                          <p:spTgt spid="3">
+                                            <p:txEl>
+                                              <p:pRg st="6" end="6"/>
+                                            </p:txEl>
+                                          </p:spTgt>
+                                        </p:tgtEl>
+                                        <p:attrNameLst>
+                                          <p:attrName>style.visibility</p:attrName>
+                                        </p:attrNameLst>
+                                      </p:cBhvr>
+                                      <p:to>
+                                        <p:strVal val="visible"/>
+                                      </p:to>
+                                    </p:set>
+                                  </p:childTnLst>
+                                </p:cTn>
+                              </p:par>
+                              <p:par>
+                                <p:cTn id="21" presetID="1" presetClass="entr" presetSubtype="0" fill="hold" grpId="0" nodeType="withEffect">
+                                  <p:stCondLst>
+                                    <p:cond delay="0"/>
+                                  </p:stCondLst>
+                                  <p:childTnLst>
+                                    <p:set>
+                                      <p:cBhvr>
+                                        <p:cTn id="22" dur="1" fill="hold">
+                                          <p:stCondLst>
+                                            <p:cond delay="0"/>
+                                          </p:stCondLst>
+                                        </p:cTn>
+                                        <p:tgtEl>
+                                          <p:spTgt spid="3">
+                                            <p:txEl>
+                                              <p:pRg st="7" end="7"/>
+                                            </p:txEl>
+                                          </p:spTgt>
+                                        </p:tgtEl>
+                                        <p:attrNameLst>
+                                          <p:attrName>style.visibility</p:attrName>
+                                        </p:attrNameLst>
+                                      </p:cBhvr>
+                                      <p:to>
+                                        <p:strVal val="visible"/>
+                                      </p:to>
+                                    </p:set>
+                                  </p:childTnLst>
+                                </p:cTn>
+                              </p:par>
+                            </p:childTnLst>
+                          </p:cTn>
+                        </p:par>
+                      </p:childTnLst>
+                    </p:cTn>
+                  </p:par>
+                </p:childTnLst>
+              </p:cTn>
+              <p:prevCondLst>
+                <p:cond evt="onPrev" delay="0">
+                  <p:tgtEl>
+                    <p:sldTgt/>
+                  </p:tgtEl>
+                </p:cond>
+              </p:prevCondLst>
+              <p:nextCondLst>
+                <p:cond evt="onNext" delay="0">
+                  <p:tgtEl>
+                    <p:sldTgt/>
+                  </p:tgtEl>
+                </p:cond>
+              </p:nextCondLst>
+            </p:seq>
+          </p:childTnLst>
+        </p:cTn>
+      </p:par>
+    </p:tnLst>
+    <p:bldLst>
+      <p:bldP spid="3" grpId="0" build="p"/>
+    </p:bldLst>
+  </p:timing>
+</p:sld>
+</file>
+
+<file path=ppt/slides/slide6.xml><?xml version="1.0" encoding="utf-8"?>
+<p:sld xmlns:a="http://schemas.openxmlformats.org/drawingml/2006/main" xmlns:r="http://schemas.openxmlformats.org/officeDocument/2006/relationships" xmlns:p="http://schemas.openxmlformats.org/presentationml/2006/main">
+  <p:cSld>
+    <p:spTree>
+      <p:nvGrpSpPr>
+        <p:cNvPr id="1" name=""/>
+        <p:cNvGrpSpPr/>
+        <p:nvPr/>
+      </p:nvGrpSpPr>
+      <p:grpSpPr>
+        <a:xfrm>
+          <a:off x="0" y="0"/>
+          <a:ext cx="0" cy="0"/>
+          <a:chOff x="0" y="0"/>
+          <a:chExt cx="0" cy="0"/>
+        </a:xfrm>
+      </p:grpSpPr>
+      <p:sp>
+        <p:nvSpPr>
+          <p:cNvPr id="2" name="Title 1">
+            <a:extLst>
+              <a:ext uri="{FF2B5EF4-FFF2-40B4-BE49-F238E27FC236}">
+                <a16:creationId xmlns:a16="http://schemas.microsoft.com/office/drawing/2014/main" id="{22EE2A52-8FF8-4737-A596-36F75D3C0AA9}"/>
+              </a:ext>
+            </a:extLst>
+          </p:cNvPr>
+          <p:cNvSpPr>
+            <a:spLocks noGrp="1"/>
+          </p:cNvSpPr>
+          <p:nvPr>
+            <p:ph type="title"/>
+          </p:nvPr>
+        </p:nvSpPr>
+        <p:spPr/>
+        <p:txBody>
+          <a:bodyPr/>
+          <a:lstStyle/>
+          <a:p>
+            <a:r>
+              <a:rPr lang="en-US" dirty="0"/>
+              <a:t>Overview</a:t>
+            </a:r>
+          </a:p>
+        </p:txBody>
+      </p:sp>
+      <p:sp>
+        <p:nvSpPr>
+          <p:cNvPr id="3" name="Content Placeholder 2">
+            <a:extLst>
+              <a:ext uri="{FF2B5EF4-FFF2-40B4-BE49-F238E27FC236}">
+                <a16:creationId xmlns:a16="http://schemas.microsoft.com/office/drawing/2014/main" id="{B01B009F-2E63-4A04-8BCE-C50D0F4ECE66}"/>
+              </a:ext>
+            </a:extLst>
+          </p:cNvPr>
+          <p:cNvSpPr>
+            <a:spLocks noGrp="1"/>
+          </p:cNvSpPr>
+          <p:nvPr>
+            <p:ph idx="1"/>
+          </p:nvPr>
+        </p:nvSpPr>
+        <p:spPr/>
+        <p:txBody>
+          <a:bodyPr/>
+          <a:lstStyle/>
+          <a:p>
+            <a:r>
+              <a:rPr lang="en-US" dirty="0"/>
+              <a:t>The approach</a:t>
+            </a:r>
+          </a:p>
+          <a:p>
+            <a:r>
+              <a:rPr lang="en-US" dirty="0"/>
+              <a:t>Simple example using an array of strings as the config (.txt)</a:t>
+            </a:r>
+          </a:p>
+          <a:p>
+            <a:pPr lvl="1"/>
+            <a:r>
+              <a:rPr lang="en-US" dirty="0"/>
+              <a:t>Evolution 1</a:t>
+            </a:r>
+          </a:p>
+          <a:p>
+            <a:pPr lvl="1"/>
+            <a:r>
+              <a:rPr lang="en-US" dirty="0"/>
+              <a:t>Evolution 2</a:t>
+            </a:r>
+          </a:p>
+          <a:p>
+            <a:r>
+              <a:rPr lang="en-US" dirty="0"/>
+              <a:t>Basic approach with a simple example</a:t>
+            </a:r>
+          </a:p>
+          <a:p>
+            <a:pPr lvl="1"/>
+            <a:r>
+              <a:rPr lang="en-US" dirty="0"/>
+              <a:t>Creating a JSON config</a:t>
+            </a:r>
+          </a:p>
+          <a:p>
+            <a:pPr lvl="1"/>
+            <a:r>
+              <a:rPr lang="en-US" dirty="0"/>
+              <a:t>Writing a script</a:t>
+            </a:r>
+          </a:p>
+          <a:p>
+            <a:pPr lvl="1"/>
+            <a:r>
+              <a:rPr lang="en-US" dirty="0"/>
+              <a:t>Setting up a CI/CD pipeline</a:t>
+            </a:r>
+          </a:p>
+          <a:p>
+            <a:r>
+              <a:rPr lang="en-US" dirty="0"/>
+              <a:t>Additional examples</a:t>
+            </a:r>
+          </a:p>
+        </p:txBody>
+      </p:sp>
+    </p:spTree>
+    <p:extLst>
+      <p:ext uri="{BB962C8B-B14F-4D97-AF65-F5344CB8AC3E}">
+        <p14:creationId xmlns:p14="http://schemas.microsoft.com/office/powerpoint/2010/main" val="2401618461"/>
+      </p:ext>
+    </p:extLst>
+  </p:cSld>
+  <p:clrMapOvr>
+    <a:masterClrMapping/>
+  </p:clrMapOvr>
+  <p:timing>
+    <p:tnLst>
+      <p:par>
+        <p:cTn id="1" dur="indefinite" restart="never" nodeType="tmRoot">
+          <p:childTnLst>
+            <p:seq concurrent="1" nextAc="seek">
+              <p:cTn id="2" dur="indefinite" nodeType="mainSeq">
+                <p:childTnLst>
+                  <p:par>
+                    <p:cTn id="3" fill="hold">
+                      <p:stCondLst>
+                        <p:cond delay="indefinite"/>
+                      </p:stCondLst>
+                      <p:childTnLst>
+                        <p:par>
+                          <p:cTn id="4" fill="hold">
+                            <p:stCondLst>
+                              <p:cond delay="0"/>
+                            </p:stCondLst>
+                            <p:childTnLst>
+                              <p:par>
+                                <p:cTn id="5" presetID="1" presetClass="entr" presetSubtype="0" fill="hold" grpId="0" nodeType="clickEffect">
+                                  <p:stCondLst>
+                                    <p:cond delay="0"/>
+                                  </p:stCondLst>
+                                  <p:childTnLst>
+                                    <p:set>
+                                      <p:cBhvr>
+                                        <p:cTn id="6" dur="1" fill="hold">
+                                          <p:stCondLst>
+                                            <p:cond delay="0"/>
+                                          </p:stCondLst>
+                                        </p:cTn>
+                                        <p:tgtEl>
+                                          <p:spTgt spid="3">
+                                            <p:txEl>
+                                              <p:pRg st="0" end="0"/>
+                                            </p:txEl>
+                                          </p:spTgt>
+                                        </p:tgtEl>
+                                        <p:attrNameLst>
+                                          <p:attrName>style.visibility</p:attrName>
+                                        </p:attrNameLst>
+                                      </p:cBhvr>
+                                      <p:to>
+                                        <p:strVal val="visible"/>
+                                      </p:to>
+                                    </p:set>
+                                  </p:childTnLst>
+                                </p:cTn>
+                              </p:par>
+                            </p:childTnLst>
+                          </p:cTn>
+                        </p:par>
+                      </p:childTnLst>
+                    </p:cTn>
+                  </p:par>
+                  <p:par>
+                    <p:cTn id="7" fill="hold">
+                      <p:stCondLst>
+                        <p:cond delay="indefinite"/>
+                      </p:stCondLst>
+                      <p:childTnLst>
+                        <p:par>
+                          <p:cTn id="8" fill="hold">
+                            <p:stCondLst>
+                              <p:cond delay="0"/>
+                            </p:stCondLst>
+                            <p:childTnLst>
+                              <p:par>
+                                <p:cTn id="9" presetID="1" presetClass="entr" presetSubtype="0" fill="hold" grpId="0" nodeType="clickEffect">
+                                  <p:stCondLst>
+                                    <p:cond delay="0"/>
+                                  </p:stCondLst>
+                                  <p:childTnLst>
+                                    <p:set>
+                                      <p:cBhvr>
+                                        <p:cTn id="10" dur="1" fill="hold">
+                                          <p:stCondLst>
+                                            <p:cond delay="0"/>
+                                          </p:stCondLst>
+                                        </p:cTn>
+                                        <p:tgtEl>
+                                          <p:spTgt spid="3">
+                                            <p:txEl>
+                                              <p:pRg st="1" end="1"/>
+                                            </p:txEl>
+                                          </p:spTgt>
+                                        </p:tgtEl>
+                                        <p:attrNameLst>
+                                          <p:attrName>style.visibility</p:attrName>
+                                        </p:attrNameLst>
+                                      </p:cBhvr>
+                                      <p:to>
+                                        <p:strVal val="visible"/>
+                                      </p:to>
+                                    </p:set>
+                                  </p:childTnLst>
+                                </p:cTn>
+                              </p:par>
+                              <p:par>
+                                <p:cTn id="11" presetID="1" presetClass="entr" presetSubtype="0" fill="hold" grpId="0" nodeType="withEffect">
+                                  <p:stCondLst>
+                                    <p:cond delay="0"/>
+                                  </p:stCondLst>
+                                  <p:childTnLst>
+                                    <p:set>
+                                      <p:cBhvr>
+                                        <p:cTn id="12" dur="1" fill="hold">
+                                          <p:stCondLst>
+                                            <p:cond delay="0"/>
+                                          </p:stCondLst>
+                                        </p:cTn>
+                                        <p:tgtEl>
+                                          <p:spTgt spid="3">
+                                            <p:txEl>
+                                              <p:pRg st="2" end="2"/>
+                                            </p:txEl>
+                                          </p:spTgt>
+                                        </p:tgtEl>
+                                        <p:attrNameLst>
+                                          <p:attrName>style.visibility</p:attrName>
+                                        </p:attrNameLst>
+                                      </p:cBhvr>
+                                      <p:to>
+                                        <p:strVal val="visible"/>
+                                      </p:to>
+                                    </p:set>
+                                  </p:childTnLst>
+                                </p:cTn>
+                              </p:par>
+                              <p:par>
+                                <p:cTn id="13" presetID="1" presetClass="entr" presetSubtype="0" fill="hold" grpId="0" nodeType="withEffect">
                                   <p:stCondLst>
                                     <p:cond delay="0"/>
                                   </p:stCondLst>
@@ -5122,15 +5476,33 @@
                                   </p:childTnLst>
                                 </p:cTn>
                               </p:par>
+                            </p:childTnLst>
+                          </p:cTn>
+                        </p:par>
+                      </p:childTnLst>
+                    </p:cTn>
+                  </p:par>
+                  <p:par>
+                    <p:cTn id="15" fill="hold">
+                      <p:stCondLst>
+                        <p:cond delay="indefinite"/>
+                      </p:stCondLst>
+                      <p:childTnLst>
+                        <p:par>
+                          <p:cTn id="16" fill="hold">
+                            <p:stCondLst>
+                              <p:cond delay="0"/>
+                            </p:stCondLst>
+                            <p:childTnLst>
                               <p:par>
-                                <p:cTn id="15" presetID="1" presetClass="entr" presetSubtype="0" fill="hold" grpId="0" nodeType="withEffect">
+                                <p:cTn id="17" presetID="1" presetClass="entr" presetSubtype="0" fill="hold" grpId="0" nodeType="clickEffect">
                                   <p:stCondLst>
                                     <p:cond delay="0"/>
                                   </p:stCondLst>
                                   <p:childTnLst>
                                     <p:set>
                                       <p:cBhvr>
-                                        <p:cTn id="16" dur="1" fill="hold">
+                                        <p:cTn id="18" dur="1" fill="hold">
                                           <p:stCondLst>
                                             <p:cond delay="0"/>
                                           </p:stCondLst>
@@ -5154,7 +5526,697 @@
                                 </p:cTn>
                               </p:par>
                               <p:par>
-                                <p:cTn id="17" presetID="1" presetClass="entr" presetSubtype="0" fill="hold" grpId="0" nodeType="withEffect">
+                                <p:cTn id="19" presetID="1" presetClass="entr" presetSubtype="0" fill="hold" grpId="0" nodeType="withEffect">
+                                  <p:stCondLst>
+                                    <p:cond delay="0"/>
+                                  </p:stCondLst>
+                                  <p:childTnLst>
+                                    <p:set>
+                                      <p:cBhvr>
+                                        <p:cTn id="20" dur="1" fill="hold">
+                                          <p:stCondLst>
+                                            <p:cond delay="0"/>
+                                          </p:stCondLst>
+                                        </p:cTn>
+                                        <p:tgtEl>
+                                          <p:spTgt spid="3">
+                                            <p:txEl>
+                                              <p:pRg st="5" end="5"/>
+                                            </p:txEl>
+                                          </p:spTgt>
+                                        </p:tgtEl>
+                                        <p:attrNameLst>
+                                          <p:attrName>style.visibility</p:attrName>
+                                        </p:attrNameLst>
+                                      </p:cBhvr>
+                                      <p:to>
+                                        <p:strVal val="visible"/>
+                                      </p:to>
+                                    </p:set>
+                                  </p:childTnLst>
+                                </p:cTn>
+                              </p:par>
+                              <p:par>
+                                <p:cTn id="21" presetID="1" presetClass="entr" presetSubtype="0" fill="hold" grpId="0" nodeType="withEffect">
+                                  <p:stCondLst>
+                                    <p:cond delay="0"/>
+                                  </p:stCondLst>
+                                  <p:childTnLst>
+                                    <p:set>
+                                      <p:cBhvr>
+                                        <p:cTn id="22" dur="1" fill="hold">
+                                          <p:stCondLst>
+                                            <p:cond delay="0"/>
+                                          </p:stCondLst>
+                                        </p:cTn>
+                                        <p:tgtEl>
+                                          <p:spTgt spid="3">
+                                            <p:txEl>
+                                              <p:pRg st="6" end="6"/>
+                                            </p:txEl>
+                                          </p:spTgt>
+                                        </p:tgtEl>
+                                        <p:attrNameLst>
+                                          <p:attrName>style.visibility</p:attrName>
+                                        </p:attrNameLst>
+                                      </p:cBhvr>
+                                      <p:to>
+                                        <p:strVal val="visible"/>
+                                      </p:to>
+                                    </p:set>
+                                  </p:childTnLst>
+                                </p:cTn>
+                              </p:par>
+                              <p:par>
+                                <p:cTn id="23" presetID="1" presetClass="entr" presetSubtype="0" fill="hold" grpId="0" nodeType="withEffect">
+                                  <p:stCondLst>
+                                    <p:cond delay="0"/>
+                                  </p:stCondLst>
+                                  <p:childTnLst>
+                                    <p:set>
+                                      <p:cBhvr>
+                                        <p:cTn id="24" dur="1" fill="hold">
+                                          <p:stCondLst>
+                                            <p:cond delay="0"/>
+                                          </p:stCondLst>
+                                        </p:cTn>
+                                        <p:tgtEl>
+                                          <p:spTgt spid="3">
+                                            <p:txEl>
+                                              <p:pRg st="7" end="7"/>
+                                            </p:txEl>
+                                          </p:spTgt>
+                                        </p:tgtEl>
+                                        <p:attrNameLst>
+                                          <p:attrName>style.visibility</p:attrName>
+                                        </p:attrNameLst>
+                                      </p:cBhvr>
+                                      <p:to>
+                                        <p:strVal val="visible"/>
+                                      </p:to>
+                                    </p:set>
+                                  </p:childTnLst>
+                                </p:cTn>
+                              </p:par>
+                            </p:childTnLst>
+                          </p:cTn>
+                        </p:par>
+                      </p:childTnLst>
+                    </p:cTn>
+                  </p:par>
+                  <p:par>
+                    <p:cTn id="25" fill="hold">
+                      <p:stCondLst>
+                        <p:cond delay="indefinite"/>
+                      </p:stCondLst>
+                      <p:childTnLst>
+                        <p:par>
+                          <p:cTn id="26" fill="hold">
+                            <p:stCondLst>
+                              <p:cond delay="0"/>
+                            </p:stCondLst>
+                            <p:childTnLst>
+                              <p:par>
+                                <p:cTn id="27" presetID="1" presetClass="entr" presetSubtype="0" fill="hold" grpId="0" nodeType="clickEffect">
+                                  <p:stCondLst>
+                                    <p:cond delay="0"/>
+                                  </p:stCondLst>
+                                  <p:childTnLst>
+                                    <p:set>
+                                      <p:cBhvr>
+                                        <p:cTn id="28" dur="1" fill="hold">
+                                          <p:stCondLst>
+                                            <p:cond delay="0"/>
+                                          </p:stCondLst>
+                                        </p:cTn>
+                                        <p:tgtEl>
+                                          <p:spTgt spid="3">
+                                            <p:txEl>
+                                              <p:pRg st="8" end="8"/>
+                                            </p:txEl>
+                                          </p:spTgt>
+                                        </p:tgtEl>
+                                        <p:attrNameLst>
+                                          <p:attrName>style.visibility</p:attrName>
+                                        </p:attrNameLst>
+                                      </p:cBhvr>
+                                      <p:to>
+                                        <p:strVal val="visible"/>
+                                      </p:to>
+                                    </p:set>
+                                  </p:childTnLst>
+                                </p:cTn>
+                              </p:par>
+                            </p:childTnLst>
+                          </p:cTn>
+                        </p:par>
+                      </p:childTnLst>
+                    </p:cTn>
+                  </p:par>
+                </p:childTnLst>
+              </p:cTn>
+              <p:prevCondLst>
+                <p:cond evt="onPrev" delay="0">
+                  <p:tgtEl>
+                    <p:sldTgt/>
+                  </p:tgtEl>
+                </p:cond>
+              </p:prevCondLst>
+              <p:nextCondLst>
+                <p:cond evt="onNext" delay="0">
+                  <p:tgtEl>
+                    <p:sldTgt/>
+                  </p:tgtEl>
+                </p:cond>
+              </p:nextCondLst>
+            </p:seq>
+          </p:childTnLst>
+        </p:cTn>
+      </p:par>
+    </p:tnLst>
+    <p:bldLst>
+      <p:bldP spid="3" grpId="0" build="p"/>
+    </p:bldLst>
+  </p:timing>
+</p:sld>
+</file>
+
+<file path=ppt/slides/slide7.xml><?xml version="1.0" encoding="utf-8"?>
+<p:sld xmlns:a="http://schemas.openxmlformats.org/drawingml/2006/main" xmlns:r="http://schemas.openxmlformats.org/officeDocument/2006/relationships" xmlns:p="http://schemas.openxmlformats.org/presentationml/2006/main">
+  <p:cSld>
+    <p:spTree>
+      <p:nvGrpSpPr>
+        <p:cNvPr id="1" name=""/>
+        <p:cNvGrpSpPr/>
+        <p:nvPr/>
+      </p:nvGrpSpPr>
+      <p:grpSpPr>
+        <a:xfrm>
+          <a:off x="0" y="0"/>
+          <a:ext cx="0" cy="0"/>
+          <a:chOff x="0" y="0"/>
+          <a:chExt cx="0" cy="0"/>
+        </a:xfrm>
+      </p:grpSpPr>
+      <p:sp>
+        <p:nvSpPr>
+          <p:cNvPr id="2" name="Title 1">
+            <a:extLst>
+              <a:ext uri="{FF2B5EF4-FFF2-40B4-BE49-F238E27FC236}">
+                <a16:creationId xmlns:a16="http://schemas.microsoft.com/office/drawing/2014/main" id="{86327D8D-5D76-4563-BCFE-4769F300E544}"/>
+              </a:ext>
+            </a:extLst>
+          </p:cNvPr>
+          <p:cNvSpPr>
+            <a:spLocks noGrp="1"/>
+          </p:cNvSpPr>
+          <p:nvPr>
+            <p:ph type="ctrTitle"/>
+          </p:nvPr>
+        </p:nvSpPr>
+        <p:spPr/>
+        <p:txBody>
+          <a:bodyPr/>
+          <a:lstStyle/>
+          <a:p>
+            <a:r>
+              <a:rPr lang="en-US" dirty="0"/>
+              <a:t>Why?</a:t>
+            </a:r>
+          </a:p>
+        </p:txBody>
+      </p:sp>
+      <p:sp>
+        <p:nvSpPr>
+          <p:cNvPr id="3" name="Subtitle 2">
+            <a:extLst>
+              <a:ext uri="{FF2B5EF4-FFF2-40B4-BE49-F238E27FC236}">
+                <a16:creationId xmlns:a16="http://schemas.microsoft.com/office/drawing/2014/main" id="{B336C568-466D-46C0-A7D2-E97063D0AF3E}"/>
+              </a:ext>
+            </a:extLst>
+          </p:cNvPr>
+          <p:cNvSpPr>
+            <a:spLocks noGrp="1"/>
+          </p:cNvSpPr>
+          <p:nvPr>
+            <p:ph type="subTitle" idx="1"/>
+          </p:nvPr>
+        </p:nvSpPr>
+        <p:spPr/>
+        <p:txBody>
+          <a:bodyPr/>
+          <a:lstStyle/>
+          <a:p>
+            <a:r>
+              <a:rPr lang="en-US" dirty="0"/>
+              <a:t>Nobody cares about the code.</a:t>
+            </a:r>
+          </a:p>
+        </p:txBody>
+      </p:sp>
+    </p:spTree>
+    <p:extLst>
+      <p:ext uri="{BB962C8B-B14F-4D97-AF65-F5344CB8AC3E}">
+        <p14:creationId xmlns:p14="http://schemas.microsoft.com/office/powerpoint/2010/main" val="4033668602"/>
+      </p:ext>
+    </p:extLst>
+  </p:cSld>
+  <p:clrMapOvr>
+    <a:masterClrMapping/>
+  </p:clrMapOvr>
+  <p:timing>
+    <p:tnLst>
+      <p:par>
+        <p:cTn id="1" dur="indefinite" restart="never" nodeType="tmRoot">
+          <p:childTnLst>
+            <p:seq concurrent="1" nextAc="seek">
+              <p:cTn id="2" dur="indefinite" nodeType="mainSeq">
+                <p:childTnLst>
+                  <p:par>
+                    <p:cTn id="3" fill="hold">
+                      <p:stCondLst>
+                        <p:cond delay="indefinite"/>
+                      </p:stCondLst>
+                      <p:childTnLst>
+                        <p:par>
+                          <p:cTn id="4" fill="hold">
+                            <p:stCondLst>
+                              <p:cond delay="0"/>
+                            </p:stCondLst>
+                            <p:childTnLst>
+                              <p:par>
+                                <p:cTn id="5" presetID="1" presetClass="entr" presetSubtype="0" fill="hold" grpId="0" nodeType="clickEffect">
+                                  <p:stCondLst>
+                                    <p:cond delay="0"/>
+                                  </p:stCondLst>
+                                  <p:childTnLst>
+                                    <p:set>
+                                      <p:cBhvr>
+                                        <p:cTn id="6" dur="1" fill="hold">
+                                          <p:stCondLst>
+                                            <p:cond delay="0"/>
+                                          </p:stCondLst>
+                                        </p:cTn>
+                                        <p:tgtEl>
+                                          <p:spTgt spid="2"/>
+                                        </p:tgtEl>
+                                        <p:attrNameLst>
+                                          <p:attrName>style.visibility</p:attrName>
+                                        </p:attrNameLst>
+                                      </p:cBhvr>
+                                      <p:to>
+                                        <p:strVal val="visible"/>
+                                      </p:to>
+                                    </p:set>
+                                  </p:childTnLst>
+                                </p:cTn>
+                              </p:par>
+                            </p:childTnLst>
+                          </p:cTn>
+                        </p:par>
+                      </p:childTnLst>
+                    </p:cTn>
+                  </p:par>
+                  <p:par>
+                    <p:cTn id="7" fill="hold">
+                      <p:stCondLst>
+                        <p:cond delay="indefinite"/>
+                      </p:stCondLst>
+                      <p:childTnLst>
+                        <p:par>
+                          <p:cTn id="8" fill="hold">
+                            <p:stCondLst>
+                              <p:cond delay="0"/>
+                            </p:stCondLst>
+                            <p:childTnLst>
+                              <p:par>
+                                <p:cTn id="9" presetID="1" presetClass="entr" presetSubtype="0" fill="hold" grpId="0" nodeType="clickEffect">
+                                  <p:stCondLst>
+                                    <p:cond delay="0"/>
+                                  </p:stCondLst>
+                                  <p:childTnLst>
+                                    <p:set>
+                                      <p:cBhvr>
+                                        <p:cTn id="10" dur="1" fill="hold">
+                                          <p:stCondLst>
+                                            <p:cond delay="0"/>
+                                          </p:stCondLst>
+                                        </p:cTn>
+                                        <p:tgtEl>
+                                          <p:spTgt spid="3">
+                                            <p:txEl>
+                                              <p:pRg st="0" end="0"/>
+                                            </p:txEl>
+                                          </p:spTgt>
+                                        </p:tgtEl>
+                                        <p:attrNameLst>
+                                          <p:attrName>style.visibility</p:attrName>
+                                        </p:attrNameLst>
+                                      </p:cBhvr>
+                                      <p:to>
+                                        <p:strVal val="visible"/>
+                                      </p:to>
+                                    </p:set>
+                                  </p:childTnLst>
+                                </p:cTn>
+                              </p:par>
+                            </p:childTnLst>
+                          </p:cTn>
+                        </p:par>
+                      </p:childTnLst>
+                    </p:cTn>
+                  </p:par>
+                </p:childTnLst>
+              </p:cTn>
+              <p:prevCondLst>
+                <p:cond evt="onPrev" delay="0">
+                  <p:tgtEl>
+                    <p:sldTgt/>
+                  </p:tgtEl>
+                </p:cond>
+              </p:prevCondLst>
+              <p:nextCondLst>
+                <p:cond evt="onNext" delay="0">
+                  <p:tgtEl>
+                    <p:sldTgt/>
+                  </p:tgtEl>
+                </p:cond>
+              </p:nextCondLst>
+            </p:seq>
+          </p:childTnLst>
+        </p:cTn>
+      </p:par>
+    </p:tnLst>
+    <p:bldLst>
+      <p:bldP spid="2" grpId="0"/>
+      <p:bldP spid="3" grpId="0" build="p"/>
+    </p:bldLst>
+  </p:timing>
+</p:sld>
+</file>
+
+<file path=ppt/slides/slide8.xml><?xml version="1.0" encoding="utf-8"?>
+<p:sld xmlns:a="http://schemas.openxmlformats.org/drawingml/2006/main" xmlns:r="http://schemas.openxmlformats.org/officeDocument/2006/relationships" xmlns:p="http://schemas.openxmlformats.org/presentationml/2006/main">
+  <p:cSld>
+    <p:spTree>
+      <p:nvGrpSpPr>
+        <p:cNvPr id="1" name=""/>
+        <p:cNvGrpSpPr/>
+        <p:nvPr/>
+      </p:nvGrpSpPr>
+      <p:grpSpPr>
+        <a:xfrm>
+          <a:off x="0" y="0"/>
+          <a:ext cx="0" cy="0"/>
+          <a:chOff x="0" y="0"/>
+          <a:chExt cx="0" cy="0"/>
+        </a:xfrm>
+      </p:grpSpPr>
+      <p:sp>
+        <p:nvSpPr>
+          <p:cNvPr id="2" name="Title 1">
+            <a:extLst>
+              <a:ext uri="{FF2B5EF4-FFF2-40B4-BE49-F238E27FC236}">
+                <a16:creationId xmlns:a16="http://schemas.microsoft.com/office/drawing/2014/main" id="{9CD82EDA-6D09-4B60-957C-70DCBB7A9D66}"/>
+              </a:ext>
+            </a:extLst>
+          </p:cNvPr>
+          <p:cNvSpPr>
+            <a:spLocks noGrp="1"/>
+          </p:cNvSpPr>
+          <p:nvPr>
+            <p:ph type="title"/>
+          </p:nvPr>
+        </p:nvSpPr>
+        <p:spPr/>
+        <p:txBody>
+          <a:bodyPr/>
+          <a:lstStyle/>
+          <a:p>
+            <a:r>
+              <a:rPr lang="en-US" dirty="0" err="1"/>
+              <a:t>aC’ing</a:t>
+            </a:r>
+            <a:r>
+              <a:rPr lang="en-US" dirty="0"/>
+              <a:t> Goals</a:t>
+            </a:r>
+          </a:p>
+        </p:txBody>
+      </p:sp>
+      <p:sp>
+        <p:nvSpPr>
+          <p:cNvPr id="3" name="Content Placeholder 2">
+            <a:extLst>
+              <a:ext uri="{FF2B5EF4-FFF2-40B4-BE49-F238E27FC236}">
+                <a16:creationId xmlns:a16="http://schemas.microsoft.com/office/drawing/2014/main" id="{B06B52DA-0968-4653-B3C6-F5D44BF596A1}"/>
+              </a:ext>
+            </a:extLst>
+          </p:cNvPr>
+          <p:cNvSpPr>
+            <a:spLocks noGrp="1"/>
+          </p:cNvSpPr>
+          <p:nvPr>
+            <p:ph idx="1"/>
+          </p:nvPr>
+        </p:nvSpPr>
+        <p:spPr/>
+        <p:txBody>
+          <a:bodyPr/>
+          <a:lstStyle/>
+          <a:p>
+            <a:r>
+              <a:rPr lang="en-US" dirty="0"/>
+              <a:t>Focus on results</a:t>
+            </a:r>
+          </a:p>
+          <a:p>
+            <a:r>
+              <a:rPr lang="en-US" dirty="0"/>
+              <a:t>Separate configuration from code</a:t>
+            </a:r>
+          </a:p>
+          <a:p>
+            <a:pPr lvl="1"/>
+            <a:r>
+              <a:rPr lang="en-US" dirty="0"/>
+              <a:t>Allows non-PowerShell users to use your system</a:t>
+            </a:r>
+          </a:p>
+          <a:p>
+            <a:pPr lvl="1"/>
+            <a:r>
+              <a:rPr lang="en-US" dirty="0"/>
+              <a:t>Tracks changes separately from code for easier auditing</a:t>
+            </a:r>
+          </a:p>
+          <a:p>
+            <a:r>
+              <a:rPr lang="en-US" dirty="0"/>
+              <a:t>Design config to be readable and understandable</a:t>
+            </a:r>
+          </a:p>
+          <a:p>
+            <a:pPr lvl="1"/>
+            <a:r>
+              <a:rPr lang="en-US" dirty="0"/>
+              <a:t>Your security team will thank you</a:t>
+            </a:r>
+          </a:p>
+        </p:txBody>
+      </p:sp>
+    </p:spTree>
+    <p:extLst>
+      <p:ext uri="{BB962C8B-B14F-4D97-AF65-F5344CB8AC3E}">
+        <p14:creationId xmlns:p14="http://schemas.microsoft.com/office/powerpoint/2010/main" val="1331682021"/>
+      </p:ext>
+    </p:extLst>
+  </p:cSld>
+  <p:clrMapOvr>
+    <a:masterClrMapping/>
+  </p:clrMapOvr>
+  <p:timing>
+    <p:tnLst>
+      <p:par>
+        <p:cTn id="1" dur="indefinite" restart="never" nodeType="tmRoot">
+          <p:childTnLst>
+            <p:seq concurrent="1" nextAc="seek">
+              <p:cTn id="2" dur="indefinite" nodeType="mainSeq">
+                <p:childTnLst>
+                  <p:par>
+                    <p:cTn id="3" fill="hold">
+                      <p:stCondLst>
+                        <p:cond delay="indefinite"/>
+                      </p:stCondLst>
+                      <p:childTnLst>
+                        <p:par>
+                          <p:cTn id="4" fill="hold">
+                            <p:stCondLst>
+                              <p:cond delay="0"/>
+                            </p:stCondLst>
+                            <p:childTnLst>
+                              <p:par>
+                                <p:cTn id="5" presetID="1" presetClass="entr" presetSubtype="0" fill="hold" grpId="0" nodeType="clickEffect">
+                                  <p:stCondLst>
+                                    <p:cond delay="0"/>
+                                  </p:stCondLst>
+                                  <p:childTnLst>
+                                    <p:set>
+                                      <p:cBhvr>
+                                        <p:cTn id="6" dur="1" fill="hold">
+                                          <p:stCondLst>
+                                            <p:cond delay="0"/>
+                                          </p:stCondLst>
+                                        </p:cTn>
+                                        <p:tgtEl>
+                                          <p:spTgt spid="3">
+                                            <p:txEl>
+                                              <p:pRg st="0" end="0"/>
+                                            </p:txEl>
+                                          </p:spTgt>
+                                        </p:tgtEl>
+                                        <p:attrNameLst>
+                                          <p:attrName>style.visibility</p:attrName>
+                                        </p:attrNameLst>
+                                      </p:cBhvr>
+                                      <p:to>
+                                        <p:strVal val="visible"/>
+                                      </p:to>
+                                    </p:set>
+                                  </p:childTnLst>
+                                </p:cTn>
+                              </p:par>
+                            </p:childTnLst>
+                          </p:cTn>
+                        </p:par>
+                      </p:childTnLst>
+                    </p:cTn>
+                  </p:par>
+                  <p:par>
+                    <p:cTn id="7" fill="hold">
+                      <p:stCondLst>
+                        <p:cond delay="indefinite"/>
+                      </p:stCondLst>
+                      <p:childTnLst>
+                        <p:par>
+                          <p:cTn id="8" fill="hold">
+                            <p:stCondLst>
+                              <p:cond delay="0"/>
+                            </p:stCondLst>
+                            <p:childTnLst>
+                              <p:par>
+                                <p:cTn id="9" presetID="1" presetClass="entr" presetSubtype="0" fill="hold" grpId="0" nodeType="clickEffect">
+                                  <p:stCondLst>
+                                    <p:cond delay="0"/>
+                                  </p:stCondLst>
+                                  <p:childTnLst>
+                                    <p:set>
+                                      <p:cBhvr>
+                                        <p:cTn id="10" dur="1" fill="hold">
+                                          <p:stCondLst>
+                                            <p:cond delay="0"/>
+                                          </p:stCondLst>
+                                        </p:cTn>
+                                        <p:tgtEl>
+                                          <p:spTgt spid="3">
+                                            <p:txEl>
+                                              <p:pRg st="1" end="1"/>
+                                            </p:txEl>
+                                          </p:spTgt>
+                                        </p:tgtEl>
+                                        <p:attrNameLst>
+                                          <p:attrName>style.visibility</p:attrName>
+                                        </p:attrNameLst>
+                                      </p:cBhvr>
+                                      <p:to>
+                                        <p:strVal val="visible"/>
+                                      </p:to>
+                                    </p:set>
+                                  </p:childTnLst>
+                                </p:cTn>
+                              </p:par>
+                              <p:par>
+                                <p:cTn id="11" presetID="1" presetClass="entr" presetSubtype="0" fill="hold" grpId="0" nodeType="withEffect">
+                                  <p:stCondLst>
+                                    <p:cond delay="0"/>
+                                  </p:stCondLst>
+                                  <p:childTnLst>
+                                    <p:set>
+                                      <p:cBhvr>
+                                        <p:cTn id="12" dur="1" fill="hold">
+                                          <p:stCondLst>
+                                            <p:cond delay="0"/>
+                                          </p:stCondLst>
+                                        </p:cTn>
+                                        <p:tgtEl>
+                                          <p:spTgt spid="3">
+                                            <p:txEl>
+                                              <p:pRg st="2" end="2"/>
+                                            </p:txEl>
+                                          </p:spTgt>
+                                        </p:tgtEl>
+                                        <p:attrNameLst>
+                                          <p:attrName>style.visibility</p:attrName>
+                                        </p:attrNameLst>
+                                      </p:cBhvr>
+                                      <p:to>
+                                        <p:strVal val="visible"/>
+                                      </p:to>
+                                    </p:set>
+                                  </p:childTnLst>
+                                </p:cTn>
+                              </p:par>
+                              <p:par>
+                                <p:cTn id="13" presetID="1" presetClass="entr" presetSubtype="0" fill="hold" grpId="0" nodeType="withEffect">
+                                  <p:stCondLst>
+                                    <p:cond delay="0"/>
+                                  </p:stCondLst>
+                                  <p:childTnLst>
+                                    <p:set>
+                                      <p:cBhvr>
+                                        <p:cTn id="14" dur="1" fill="hold">
+                                          <p:stCondLst>
+                                            <p:cond delay="0"/>
+                                          </p:stCondLst>
+                                        </p:cTn>
+                                        <p:tgtEl>
+                                          <p:spTgt spid="3">
+                                            <p:txEl>
+                                              <p:pRg st="3" end="3"/>
+                                            </p:txEl>
+                                          </p:spTgt>
+                                        </p:tgtEl>
+                                        <p:attrNameLst>
+                                          <p:attrName>style.visibility</p:attrName>
+                                        </p:attrNameLst>
+                                      </p:cBhvr>
+                                      <p:to>
+                                        <p:strVal val="visible"/>
+                                      </p:to>
+                                    </p:set>
+                                  </p:childTnLst>
+                                </p:cTn>
+                              </p:par>
+                            </p:childTnLst>
+                          </p:cTn>
+                        </p:par>
+                      </p:childTnLst>
+                    </p:cTn>
+                  </p:par>
+                  <p:par>
+                    <p:cTn id="15" fill="hold">
+                      <p:stCondLst>
+                        <p:cond delay="indefinite"/>
+                      </p:stCondLst>
+                      <p:childTnLst>
+                        <p:par>
+                          <p:cTn id="16" fill="hold">
+                            <p:stCondLst>
+                              <p:cond delay="0"/>
+                            </p:stCondLst>
+                            <p:childTnLst>
+                              <p:par>
+                                <p:cTn id="17" presetID="1" presetClass="entr" presetSubtype="0" fill="hold" grpId="0" nodeType="clickEffect">
                                   <p:stCondLst>
                                     <p:cond delay="0"/>
                                   </p:stCondLst>
@@ -5162,6 +6224,37 @@
                                     <p:set>
                                       <p:cBhvr>
                                         <p:cTn id="18" dur="1" fill="hold">
+                                          <p:stCondLst>
+                                            <p:cond delay="0"/>
+                                          </p:stCondLst>
+                                        </p:cTn>
+                                        <p:tgtEl>
+                                          <p:spTgt spid="3">
+                                            <p:txEl>
+                                              <p:pRg st="4" end="4"/>
+                                            </p:txEl>
+                                          </p:spTgt>
+                                        </p:tgtEl>
+                                        <p:attrNameLst>
+                                          <p:attrName>style.visibility</p:attrName>
+                                        </p:attrNameLst>
+                                      </p:cBhvr>
+                                      <p:to>
+                                        <p:strVal val="visible"/>
+                                      </p:to>
+                                    </p:set>
+                                  </p:childTnLst>
+                                </p:cTn>
+                              </p:par>
+                              <p:par>
+                                <p:cTn id="19" presetID="1" presetClass="entr" presetSubtype="0" fill="hold" grpId="0" nodeType="withEffect">
+                                  <p:stCondLst>
+                                    <p:cond delay="0"/>
+                                  </p:stCondLst>
+                                  <p:childTnLst>
+                                    <p:set>
+                                      <p:cBhvr>
+                                        <p:cTn id="20" dur="1" fill="hold">
                                           <p:stCondLst>
                                             <p:cond delay="0"/>
                                           </p:stCondLst>
@@ -5218,7 +6311,7 @@
 </p:sld>
 </file>
 
-<file path=ppt/slides/slide5.xml><?xml version="1.0" encoding="utf-8"?>
+<file path=ppt/slides/slide9.xml><?xml version="1.0" encoding="utf-8"?>
 <p:sld xmlns:a="http://schemas.openxmlformats.org/drawingml/2006/main" xmlns:r="http://schemas.openxmlformats.org/officeDocument/2006/relationships" xmlns:p="http://schemas.openxmlformats.org/presentationml/2006/main">
   <p:cSld>
     <p:spTree>
@@ -5292,13 +6385,13 @@
           <a:p>
             <a:r>
               <a:rPr lang="en-US" dirty="0"/>
-              <a:t>JSON</a:t>
+              <a:t>JSON / YAML</a:t>
             </a:r>
           </a:p>
           <a:p>
             <a:r>
               <a:rPr lang="en-US" dirty="0"/>
-              <a:t>Understanding of Modules and APIs</a:t>
+              <a:t>Understanding of Modules</a:t>
             </a:r>
           </a:p>
         </p:txBody>
@@ -5307,230 +6400,6 @@
     <p:extLst>
       <p:ext uri="{BB962C8B-B14F-4D97-AF65-F5344CB8AC3E}">
         <p14:creationId xmlns:p14="http://schemas.microsoft.com/office/powerpoint/2010/main" val="4066512176"/>
-      </p:ext>
-    </p:extLst>
-  </p:cSld>
-  <p:clrMapOvr>
-    <a:masterClrMapping/>
-  </p:clrMapOvr>
-</p:sld>
-</file>
-
-<file path=ppt/slides/slide6.xml><?xml version="1.0" encoding="utf-8"?>
-<p:sld xmlns:a="http://schemas.openxmlformats.org/drawingml/2006/main" xmlns:r="http://schemas.openxmlformats.org/officeDocument/2006/relationships" xmlns:p="http://schemas.openxmlformats.org/presentationml/2006/main">
-  <p:cSld>
-    <p:spTree>
-      <p:nvGrpSpPr>
-        <p:cNvPr id="1" name=""/>
-        <p:cNvGrpSpPr/>
-        <p:nvPr/>
-      </p:nvGrpSpPr>
-      <p:grpSpPr>
-        <a:xfrm>
-          <a:off x="0" y="0"/>
-          <a:ext cx="0" cy="0"/>
-          <a:chOff x="0" y="0"/>
-          <a:chExt cx="0" cy="0"/>
-        </a:xfrm>
-      </p:grpSpPr>
-      <p:sp>
-        <p:nvSpPr>
-          <p:cNvPr id="2" name="Title 1">
-            <a:extLst>
-              <a:ext uri="{FF2B5EF4-FFF2-40B4-BE49-F238E27FC236}">
-                <a16:creationId xmlns:a16="http://schemas.microsoft.com/office/drawing/2014/main" id="{22EE2A52-8FF8-4737-A596-36F75D3C0AA9}"/>
-              </a:ext>
-            </a:extLst>
-          </p:cNvPr>
-          <p:cNvSpPr>
-            <a:spLocks noGrp="1"/>
-          </p:cNvSpPr>
-          <p:nvPr>
-            <p:ph type="title"/>
-          </p:nvPr>
-        </p:nvSpPr>
-        <p:spPr/>
-        <p:txBody>
-          <a:bodyPr/>
-          <a:lstStyle/>
-          <a:p>
-            <a:r>
-              <a:rPr lang="en-US" dirty="0"/>
-              <a:t>Overview</a:t>
-            </a:r>
-          </a:p>
-        </p:txBody>
-      </p:sp>
-      <p:sp>
-        <p:nvSpPr>
-          <p:cNvPr id="3" name="Content Placeholder 2">
-            <a:extLst>
-              <a:ext uri="{FF2B5EF4-FFF2-40B4-BE49-F238E27FC236}">
-                <a16:creationId xmlns:a16="http://schemas.microsoft.com/office/drawing/2014/main" id="{B01B009F-2E63-4A04-8BCE-C50D0F4ECE66}"/>
-              </a:ext>
-            </a:extLst>
-          </p:cNvPr>
-          <p:cNvSpPr>
-            <a:spLocks noGrp="1"/>
-          </p:cNvSpPr>
-          <p:nvPr>
-            <p:ph idx="1"/>
-          </p:nvPr>
-        </p:nvSpPr>
-        <p:spPr/>
-        <p:txBody>
-          <a:bodyPr/>
-          <a:lstStyle/>
-          <a:p>
-            <a:r>
-              <a:rPr lang="en-US" dirty="0"/>
-              <a:t>Simple example using an array of strings as the config (.txt)</a:t>
-            </a:r>
-          </a:p>
-          <a:p>
-            <a:pPr lvl="1"/>
-            <a:r>
-              <a:rPr lang="en-US" dirty="0"/>
-              <a:t>Demonstrate the approach</a:t>
-            </a:r>
-          </a:p>
-          <a:p>
-            <a:r>
-              <a:rPr lang="en-US" dirty="0"/>
-              <a:t>Basic approach with a simple example</a:t>
-            </a:r>
-          </a:p>
-          <a:p>
-            <a:pPr lvl="1"/>
-            <a:r>
-              <a:rPr lang="en-US" dirty="0"/>
-              <a:t>Creating a JSON config</a:t>
-            </a:r>
-          </a:p>
-          <a:p>
-            <a:pPr lvl="1"/>
-            <a:r>
-              <a:rPr lang="en-US" dirty="0"/>
-              <a:t>Writing a script</a:t>
-            </a:r>
-          </a:p>
-          <a:p>
-            <a:pPr lvl="1"/>
-            <a:r>
-              <a:rPr lang="en-US" dirty="0"/>
-              <a:t>Setting up a CI/CD pipeline</a:t>
-            </a:r>
-          </a:p>
-          <a:p>
-            <a:r>
-              <a:rPr lang="en-US" dirty="0"/>
-              <a:t>Additional examples</a:t>
-            </a:r>
-          </a:p>
-        </p:txBody>
-      </p:sp>
-    </p:spTree>
-    <p:extLst>
-      <p:ext uri="{BB962C8B-B14F-4D97-AF65-F5344CB8AC3E}">
-        <p14:creationId xmlns:p14="http://schemas.microsoft.com/office/powerpoint/2010/main" val="2401618461"/>
-      </p:ext>
-    </p:extLst>
-  </p:cSld>
-  <p:clrMapOvr>
-    <a:masterClrMapping/>
-  </p:clrMapOvr>
-</p:sld>
-</file>
-
-<file path=ppt/slides/slide7.xml><?xml version="1.0" encoding="utf-8"?>
-<p:sld xmlns:a="http://schemas.openxmlformats.org/drawingml/2006/main" xmlns:r="http://schemas.openxmlformats.org/officeDocument/2006/relationships" xmlns:p="http://schemas.openxmlformats.org/presentationml/2006/main">
-  <p:cSld>
-    <p:spTree>
-      <p:nvGrpSpPr>
-        <p:cNvPr id="1" name=""/>
-        <p:cNvGrpSpPr/>
-        <p:nvPr/>
-      </p:nvGrpSpPr>
-      <p:grpSpPr>
-        <a:xfrm>
-          <a:off x="0" y="0"/>
-          <a:ext cx="0" cy="0"/>
-          <a:chOff x="0" y="0"/>
-          <a:chExt cx="0" cy="0"/>
-        </a:xfrm>
-      </p:grpSpPr>
-      <p:sp>
-        <p:nvSpPr>
-          <p:cNvPr id="2" name="Title 1">
-            <a:extLst>
-              <a:ext uri="{FF2B5EF4-FFF2-40B4-BE49-F238E27FC236}">
-                <a16:creationId xmlns:a16="http://schemas.microsoft.com/office/drawing/2014/main" id="{F1661924-E51B-4AA1-A1C5-C9AD9EE32D81}"/>
-              </a:ext>
-            </a:extLst>
-          </p:cNvPr>
-          <p:cNvSpPr>
-            <a:spLocks noGrp="1"/>
-          </p:cNvSpPr>
-          <p:nvPr>
-            <p:ph type="title"/>
-          </p:nvPr>
-        </p:nvSpPr>
-        <p:spPr/>
-        <p:txBody>
-          <a:bodyPr/>
-          <a:lstStyle/>
-          <a:p>
-            <a:r>
-              <a:rPr lang="en-US" dirty="0"/>
-              <a:t>Demo Environment</a:t>
-            </a:r>
-          </a:p>
-        </p:txBody>
-      </p:sp>
-      <p:sp>
-        <p:nvSpPr>
-          <p:cNvPr id="3" name="Content Placeholder 2">
-            <a:extLst>
-              <a:ext uri="{FF2B5EF4-FFF2-40B4-BE49-F238E27FC236}">
-                <a16:creationId xmlns:a16="http://schemas.microsoft.com/office/drawing/2014/main" id="{4FA49B7C-A4DE-4ADA-8216-70A81166A541}"/>
-              </a:ext>
-            </a:extLst>
-          </p:cNvPr>
-          <p:cNvSpPr>
-            <a:spLocks noGrp="1"/>
-          </p:cNvSpPr>
-          <p:nvPr>
-            <p:ph idx="1"/>
-          </p:nvPr>
-        </p:nvSpPr>
-        <p:spPr/>
-        <p:txBody>
-          <a:bodyPr/>
-          <a:lstStyle/>
-          <a:p>
-            <a:r>
-              <a:rPr lang="en-US" dirty="0"/>
-              <a:t>Windows 10</a:t>
-            </a:r>
-          </a:p>
-          <a:p>
-            <a:r>
-              <a:rPr lang="en-US" dirty="0"/>
-              <a:t>VS Code (latest version)</a:t>
-            </a:r>
-          </a:p>
-          <a:p>
-            <a:r>
-              <a:rPr lang="en-US" dirty="0"/>
-              <a:t>PowerShell 7.2.2</a:t>
-            </a:r>
-          </a:p>
-        </p:txBody>
-      </p:sp>
-    </p:spTree>
-    <p:extLst>
-      <p:ext uri="{BB962C8B-B14F-4D97-AF65-F5344CB8AC3E}">
-        <p14:creationId xmlns:p14="http://schemas.microsoft.com/office/powerpoint/2010/main" val="3298450064"/>
       </p:ext>
     </p:extLst>
   </p:cSld>

</xml_diff>

<commit_message>
small update to prez, adding links
</commit_message>
<xml_diff>
--- a/2022-04-26 - aC the world! As Code for Anything/PowerShell Summit 2022 - aC the World!.pptx
+++ b/2022-04-26 - aC the world! As Code for Anything/PowerShell Summit 2022 - aC the World!.pptx
@@ -270,7 +270,7 @@
           <a:p>
             <a:fld id="{D46B952B-F692-4DD1-9678-FCDA40C3FC40}" type="datetimeFigureOut">
               <a:rPr lang="en-US" smtClean="0"/>
-              <a:t>4/25/2022</a:t>
+              <a:t>4/26/2022</a:t>
             </a:fld>
             <a:endParaRPr lang="en-US"/>
           </a:p>
@@ -468,7 +468,7 @@
           <a:p>
             <a:fld id="{D46B952B-F692-4DD1-9678-FCDA40C3FC40}" type="datetimeFigureOut">
               <a:rPr lang="en-US" smtClean="0"/>
-              <a:t>4/25/2022</a:t>
+              <a:t>4/26/2022</a:t>
             </a:fld>
             <a:endParaRPr lang="en-US"/>
           </a:p>
@@ -676,7 +676,7 @@
           <a:p>
             <a:fld id="{D46B952B-F692-4DD1-9678-FCDA40C3FC40}" type="datetimeFigureOut">
               <a:rPr lang="en-US" smtClean="0"/>
-              <a:t>4/25/2022</a:t>
+              <a:t>4/26/2022</a:t>
             </a:fld>
             <a:endParaRPr lang="en-US"/>
           </a:p>
@@ -874,7 +874,7 @@
           <a:p>
             <a:fld id="{D46B952B-F692-4DD1-9678-FCDA40C3FC40}" type="datetimeFigureOut">
               <a:rPr lang="en-US" smtClean="0"/>
-              <a:t>4/25/2022</a:t>
+              <a:t>4/26/2022</a:t>
             </a:fld>
             <a:endParaRPr lang="en-US"/>
           </a:p>
@@ -1149,7 +1149,7 @@
           <a:p>
             <a:fld id="{D46B952B-F692-4DD1-9678-FCDA40C3FC40}" type="datetimeFigureOut">
               <a:rPr lang="en-US" smtClean="0"/>
-              <a:t>4/25/2022</a:t>
+              <a:t>4/26/2022</a:t>
             </a:fld>
             <a:endParaRPr lang="en-US"/>
           </a:p>
@@ -1414,7 +1414,7 @@
           <a:p>
             <a:fld id="{D46B952B-F692-4DD1-9678-FCDA40C3FC40}" type="datetimeFigureOut">
               <a:rPr lang="en-US" smtClean="0"/>
-              <a:t>4/25/2022</a:t>
+              <a:t>4/26/2022</a:t>
             </a:fld>
             <a:endParaRPr lang="en-US"/>
           </a:p>
@@ -1826,7 +1826,7 @@
           <a:p>
             <a:fld id="{D46B952B-F692-4DD1-9678-FCDA40C3FC40}" type="datetimeFigureOut">
               <a:rPr lang="en-US" smtClean="0"/>
-              <a:t>4/25/2022</a:t>
+              <a:t>4/26/2022</a:t>
             </a:fld>
             <a:endParaRPr lang="en-US"/>
           </a:p>
@@ -1967,7 +1967,7 @@
           <a:p>
             <a:fld id="{D46B952B-F692-4DD1-9678-FCDA40C3FC40}" type="datetimeFigureOut">
               <a:rPr lang="en-US" smtClean="0"/>
-              <a:t>4/25/2022</a:t>
+              <a:t>4/26/2022</a:t>
             </a:fld>
             <a:endParaRPr lang="en-US"/>
           </a:p>
@@ -2080,7 +2080,7 @@
           <a:p>
             <a:fld id="{D46B952B-F692-4DD1-9678-FCDA40C3FC40}" type="datetimeFigureOut">
               <a:rPr lang="en-US" smtClean="0"/>
-              <a:t>4/25/2022</a:t>
+              <a:t>4/26/2022</a:t>
             </a:fld>
             <a:endParaRPr lang="en-US"/>
           </a:p>
@@ -2391,7 +2391,7 @@
           <a:p>
             <a:fld id="{D46B952B-F692-4DD1-9678-FCDA40C3FC40}" type="datetimeFigureOut">
               <a:rPr lang="en-US" smtClean="0"/>
-              <a:t>4/25/2022</a:t>
+              <a:t>4/26/2022</a:t>
             </a:fld>
             <a:endParaRPr lang="en-US"/>
           </a:p>
@@ -2679,7 +2679,7 @@
           <a:p>
             <a:fld id="{D46B952B-F692-4DD1-9678-FCDA40C3FC40}" type="datetimeFigureOut">
               <a:rPr lang="en-US" smtClean="0"/>
-              <a:t>4/25/2022</a:t>
+              <a:t>4/26/2022</a:t>
             </a:fld>
             <a:endParaRPr lang="en-US"/>
           </a:p>
@@ -2929,7 +2929,7 @@
           <a:p>
             <a:fld id="{D46B952B-F692-4DD1-9678-FCDA40C3FC40}" type="datetimeFigureOut">
               <a:rPr lang="en-US" smtClean="0"/>
-              <a:t>4/25/2022</a:t>
+              <a:t>4/26/2022</a:t>
             </a:fld>
             <a:endParaRPr lang="en-US"/>
           </a:p>
@@ -3546,6 +3546,12 @@
               <a:t>Your security team will thank you</a:t>
             </a:r>
           </a:p>
+          <a:p>
+            <a:r>
+              <a:rPr lang="en-US" dirty="0"/>
+              <a:t>Do DevOps without being in DevOps</a:t>
+            </a:r>
+          </a:p>
         </p:txBody>
       </p:sp>
     </p:spTree>
@@ -3786,6 +3792,55 @@
                                           <p:spTgt spid="3">
                                             <p:txEl>
                                               <p:pRg st="5" end="5"/>
+                                            </p:txEl>
+                                          </p:spTgt>
+                                        </p:tgtEl>
+                                        <p:attrNameLst>
+                                          <p:attrName>style.visibility</p:attrName>
+                                        </p:attrNameLst>
+                                      </p:cBhvr>
+                                      <p:to>
+                                        <p:strVal val="visible"/>
+                                      </p:to>
+                                    </p:set>
+                                  </p:childTnLst>
+                                </p:cTn>
+                              </p:par>
+                            </p:childTnLst>
+                          </p:cTn>
+                        </p:par>
+                      </p:childTnLst>
+                    </p:cTn>
+                  </p:par>
+                  <p:par>
+                    <p:cTn id="21" fill="hold">
+                      <p:stCondLst>
+                        <p:cond delay="indefinite"/>
+                      </p:stCondLst>
+                      <p:childTnLst>
+                        <p:par>
+                          <p:cTn id="22" fill="hold">
+                            <p:stCondLst>
+                              <p:cond delay="0"/>
+                            </p:stCondLst>
+                            <p:childTnLst>
+                              <p:par>
+                                <p:cTn id="23" presetID="1" presetClass="entr" presetSubtype="0" fill="hold" grpId="0" nodeType="clickEffect">
+                                  <p:stCondLst>
+                                    <p:cond delay="0"/>
+                                  </p:stCondLst>
+                                  <p:childTnLst>
+                                    <p:set>
+                                      <p:cBhvr>
+                                        <p:cTn id="24" dur="1" fill="hold">
+                                          <p:stCondLst>
+                                            <p:cond delay="0"/>
+                                          </p:stCondLst>
+                                        </p:cTn>
+                                        <p:tgtEl>
+                                          <p:spTgt spid="3">
+                                            <p:txEl>
+                                              <p:pRg st="6" end="6"/>
                                             </p:txEl>
                                           </p:spTgt>
                                         </p:tgtEl>

</xml_diff>